<commit_message>
Fixed missing weight update in trainBoost
</commit_message>
<xml_diff>
--- a/Bayes_Boosting_presentation.pptx
+++ b/Bayes_Boosting_presentation.pptx
@@ -5,14 +5,15 @@
     <p:sldMasterId id="2147483685" r:id="rId4"/>
   </p:sldMasterIdLst>
   <p:notesMasterIdLst>
-    <p:notesMasterId r:id="rId7"/>
+    <p:notesMasterId r:id="rId8"/>
   </p:notesMasterIdLst>
   <p:handoutMasterIdLst>
-    <p:handoutMasterId r:id="rId8"/>
+    <p:handoutMasterId r:id="rId9"/>
   </p:handoutMasterIdLst>
   <p:sldIdLst>
     <p:sldId id="338" r:id="rId5"/>
     <p:sldId id="339" r:id="rId6"/>
+    <p:sldId id="341" r:id="rId7"/>
   </p:sldIdLst>
   <p:sldSz cx="12192000" cy="6858000"/>
   <p:notesSz cx="6858000" cy="9144000"/>
@@ -122,10 +123,16 @@
 </p:presentation>
 </file>
 
+<file path=ppt/authors.xml><?xml version="1.0" encoding="utf-8"?>
+<p188:authorLst xmlns:a="http://schemas.openxmlformats.org/drawingml/2006/main" xmlns:r="http://schemas.openxmlformats.org/officeDocument/2006/relationships" xmlns:p188="http://schemas.microsoft.com/office/powerpoint/2018/8/main">
+  <p188:author id="{DD8B113B-01EE-D7C5-3D76-082683B119F2}" name="Abel Valko" initials="AV" userId="10a3269d5dfe4f52" providerId="Windows Live"/>
+</p188:authorLst>
+</file>
+
 <file path=ppt/revisionInfo.xml><?xml version="1.0" encoding="utf-8"?>
 <p1510:revInfo xmlns:a="http://schemas.openxmlformats.org/drawingml/2006/main" xmlns:r="http://schemas.openxmlformats.org/officeDocument/2006/relationships" xmlns:p1510="http://schemas.microsoft.com/office/powerpoint/2015/10/main">
   <p1510:revLst>
-    <p1510:client id="{60C8D2A3-1ADE-464A-84D8-267C02763CD5}" v="1" dt="2021-10-17T12:49:55.754"/>
+    <p1510:client id="{60C8D2A3-1ADE-464A-84D8-267C02763CD5}" v="5" dt="2021-10-18T07:49:16.958"/>
   </p1510:revLst>
 </p1510:revInfo>
 </file>
@@ -134,8 +141,8 @@
 <pc:chgInfo xmlns:a="http://schemas.openxmlformats.org/drawingml/2006/main" xmlns:r="http://schemas.openxmlformats.org/officeDocument/2006/relationships" xmlns:ac="http://schemas.microsoft.com/office/drawing/2013/main/command" xmlns:pc="http://schemas.microsoft.com/office/powerpoint/2013/main/command">
   <pc:docChgLst>
     <pc:chgData name="Abel Valko" userId="10a3269d5dfe4f52" providerId="LiveId" clId="{60C8D2A3-1ADE-464A-84D8-267C02763CD5}"/>
-    <pc:docChg chg="custSel addSld delSld modSld">
-      <pc:chgData name="Abel Valko" userId="10a3269d5dfe4f52" providerId="LiveId" clId="{60C8D2A3-1ADE-464A-84D8-267C02763CD5}" dt="2021-10-17T13:29:05.086" v="148" actId="20577"/>
+    <pc:docChg chg="undo custSel addSld delSld modSld sldOrd">
+      <pc:chgData name="Abel Valko" userId="10a3269d5dfe4f52" providerId="LiveId" clId="{60C8D2A3-1ADE-464A-84D8-267C02763CD5}" dt="2021-10-18T08:08:38.663" v="838" actId="1076"/>
       <pc:docMkLst>
         <pc:docMk/>
       </pc:docMkLst>
@@ -247,8 +254,8 @@
           <pc:sldMk cId="2058852336" sldId="339"/>
         </pc:sldMkLst>
       </pc:sldChg>
-      <pc:sldChg chg="modSp new mod">
-        <pc:chgData name="Abel Valko" userId="10a3269d5dfe4f52" providerId="LiveId" clId="{60C8D2A3-1ADE-464A-84D8-267C02763CD5}" dt="2021-10-17T13:29:05.086" v="148" actId="20577"/>
+      <pc:sldChg chg="addSp delSp modSp new mod">
+        <pc:chgData name="Abel Valko" userId="10a3269d5dfe4f52" providerId="LiveId" clId="{60C8D2A3-1ADE-464A-84D8-267C02763CD5}" dt="2021-10-18T07:27:29.126" v="615" actId="1076"/>
         <pc:sldMkLst>
           <pc:docMk/>
           <pc:sldMk cId="3024174952" sldId="339"/>
@@ -261,6 +268,77 @@
             <ac:spMk id="2" creationId="{13DA2BD8-448F-474C-BD37-54043ABB7369}"/>
           </ac:spMkLst>
         </pc:spChg>
+        <pc:spChg chg="mod">
+          <ac:chgData name="Abel Valko" userId="10a3269d5dfe4f52" providerId="LiveId" clId="{60C8D2A3-1ADE-464A-84D8-267C02763CD5}" dt="2021-10-18T07:27:06.806" v="603" actId="14100"/>
+          <ac:spMkLst>
+            <pc:docMk/>
+            <pc:sldMk cId="3024174952" sldId="339"/>
+            <ac:spMk id="3" creationId="{B8CCE1A7-598C-48E6-94D2-CC07FF1CB111}"/>
+          </ac:spMkLst>
+        </pc:spChg>
+        <pc:spChg chg="add del">
+          <ac:chgData name="Abel Valko" userId="10a3269d5dfe4f52" providerId="LiveId" clId="{60C8D2A3-1ADE-464A-84D8-267C02763CD5}" dt="2021-10-18T06:56:26.884" v="264" actId="22"/>
+          <ac:spMkLst>
+            <pc:docMk/>
+            <pc:sldMk cId="3024174952" sldId="339"/>
+            <ac:spMk id="7" creationId="{D9949FFF-70E2-46F1-B642-CF283BCA6264}"/>
+          </ac:spMkLst>
+        </pc:spChg>
+        <pc:spChg chg="add del">
+          <ac:chgData name="Abel Valko" userId="10a3269d5dfe4f52" providerId="LiveId" clId="{60C8D2A3-1ADE-464A-84D8-267C02763CD5}" dt="2021-10-18T06:56:28.975" v="266" actId="22"/>
+          <ac:spMkLst>
+            <pc:docMk/>
+            <pc:sldMk cId="3024174952" sldId="339"/>
+            <ac:spMk id="9" creationId="{C1DC51C5-C084-4591-B378-2B20929080AB}"/>
+          </ac:spMkLst>
+        </pc:spChg>
+        <pc:picChg chg="add mod modCrop">
+          <ac:chgData name="Abel Valko" userId="10a3269d5dfe4f52" providerId="LiveId" clId="{60C8D2A3-1ADE-464A-84D8-267C02763CD5}" dt="2021-10-18T07:27:29.126" v="615" actId="1076"/>
+          <ac:picMkLst>
+            <pc:docMk/>
+            <pc:sldMk cId="3024174952" sldId="339"/>
+            <ac:picMk id="5" creationId="{57D0332D-7ADB-4644-AA35-CE718BB86767}"/>
+          </ac:picMkLst>
+        </pc:picChg>
+      </pc:sldChg>
+      <pc:sldChg chg="addSp delSp modSp add del mod ord">
+        <pc:chgData name="Abel Valko" userId="10a3269d5dfe4f52" providerId="LiveId" clId="{60C8D2A3-1ADE-464A-84D8-267C02763CD5}" dt="2021-10-18T07:18:16.567" v="597" actId="47"/>
+        <pc:sldMkLst>
+          <pc:docMk/>
+          <pc:sldMk cId="169451217" sldId="340"/>
+        </pc:sldMkLst>
+        <pc:spChg chg="mod">
+          <ac:chgData name="Abel Valko" userId="10a3269d5dfe4f52" providerId="LiveId" clId="{60C8D2A3-1ADE-464A-84D8-267C02763CD5}" dt="2021-10-18T07:14:55.196" v="283" actId="20577"/>
+          <ac:spMkLst>
+            <pc:docMk/>
+            <pc:sldMk cId="169451217" sldId="340"/>
+            <ac:spMk id="2" creationId="{13DA2BD8-448F-474C-BD37-54043ABB7369}"/>
+          </ac:spMkLst>
+        </pc:spChg>
+        <pc:spChg chg="mod">
+          <ac:chgData name="Abel Valko" userId="10a3269d5dfe4f52" providerId="LiveId" clId="{60C8D2A3-1ADE-464A-84D8-267C02763CD5}" dt="2021-10-18T06:56:33.500" v="268" actId="20577"/>
+          <ac:spMkLst>
+            <pc:docMk/>
+            <pc:sldMk cId="169451217" sldId="340"/>
+            <ac:spMk id="3" creationId="{B8CCE1A7-598C-48E6-94D2-CC07FF1CB111}"/>
+          </ac:spMkLst>
+        </pc:spChg>
+        <pc:spChg chg="add mod">
+          <ac:chgData name="Abel Valko" userId="10a3269d5dfe4f52" providerId="LiveId" clId="{60C8D2A3-1ADE-464A-84D8-267C02763CD5}" dt="2021-10-18T07:17:58.478" v="585" actId="21"/>
+          <ac:spMkLst>
+            <pc:docMk/>
+            <pc:sldMk cId="169451217" sldId="340"/>
+            <ac:spMk id="6" creationId="{41BAB370-151B-495E-B157-0A47C25579AF}"/>
+          </ac:spMkLst>
+        </pc:spChg>
+        <pc:picChg chg="del">
+          <ac:chgData name="Abel Valko" userId="10a3269d5dfe4f52" providerId="LiveId" clId="{60C8D2A3-1ADE-464A-84D8-267C02763CD5}" dt="2021-10-18T06:56:35.053" v="269" actId="478"/>
+          <ac:picMkLst>
+            <pc:docMk/>
+            <pc:sldMk cId="169451217" sldId="340"/>
+            <ac:picMk id="5" creationId="{57D0332D-7ADB-4644-AA35-CE718BB86767}"/>
+          </ac:picMkLst>
+        </pc:picChg>
       </pc:sldChg>
       <pc:sldChg chg="del">
         <pc:chgData name="Abel Valko" userId="10a3269d5dfe4f52" providerId="LiveId" clId="{60C8D2A3-1ADE-464A-84D8-267C02763CD5}" dt="2021-10-17T12:49:59.494" v="2" actId="47"/>
@@ -268,6 +346,84 @@
           <pc:docMk/>
           <pc:sldMk cId="617108373" sldId="340"/>
         </pc:sldMkLst>
+      </pc:sldChg>
+      <pc:sldChg chg="modSp add del mod addCm">
+        <pc:chgData name="Abel Valko" userId="10a3269d5dfe4f52" providerId="LiveId" clId="{60C8D2A3-1ADE-464A-84D8-267C02763CD5}" dt="2021-10-18T07:53:21.063" v="782" actId="47"/>
+        <pc:sldMkLst>
+          <pc:docMk/>
+          <pc:sldMk cId="4202781665" sldId="340"/>
+        </pc:sldMkLst>
+        <pc:spChg chg="mod">
+          <ac:chgData name="Abel Valko" userId="10a3269d5dfe4f52" providerId="LiveId" clId="{60C8D2A3-1ADE-464A-84D8-267C02763CD5}" dt="2021-10-18T07:29:09.271" v="643" actId="313"/>
+          <ac:spMkLst>
+            <pc:docMk/>
+            <pc:sldMk cId="4202781665" sldId="340"/>
+            <ac:spMk id="2" creationId="{13DA2BD8-448F-474C-BD37-54043ABB7369}"/>
+          </ac:spMkLst>
+        </pc:spChg>
+        <pc:spChg chg="mod">
+          <ac:chgData name="Abel Valko" userId="10a3269d5dfe4f52" providerId="LiveId" clId="{60C8D2A3-1ADE-464A-84D8-267C02763CD5}" dt="2021-10-18T07:40:54.889" v="695" actId="20577"/>
+          <ac:spMkLst>
+            <pc:docMk/>
+            <pc:sldMk cId="4202781665" sldId="340"/>
+            <ac:spMk id="3" creationId="{B8CCE1A7-598C-48E6-94D2-CC07FF1CB111}"/>
+          </ac:spMkLst>
+        </pc:spChg>
+        <pc:picChg chg="mod">
+          <ac:chgData name="Abel Valko" userId="10a3269d5dfe4f52" providerId="LiveId" clId="{60C8D2A3-1ADE-464A-84D8-267C02763CD5}" dt="2021-10-18T07:28:23.016" v="642" actId="1076"/>
+          <ac:picMkLst>
+            <pc:docMk/>
+            <pc:sldMk cId="4202781665" sldId="340"/>
+            <ac:picMk id="5" creationId="{57D0332D-7ADB-4644-AA35-CE718BB86767}"/>
+          </ac:picMkLst>
+        </pc:picChg>
+      </pc:sldChg>
+      <pc:sldChg chg="addSp modSp add mod">
+        <pc:chgData name="Abel Valko" userId="10a3269d5dfe4f52" providerId="LiveId" clId="{60C8D2A3-1ADE-464A-84D8-267C02763CD5}" dt="2021-10-18T08:08:38.663" v="838" actId="1076"/>
+        <pc:sldMkLst>
+          <pc:docMk/>
+          <pc:sldMk cId="4279073654" sldId="341"/>
+        </pc:sldMkLst>
+        <pc:spChg chg="mod">
+          <ac:chgData name="Abel Valko" userId="10a3269d5dfe4f52" providerId="LiveId" clId="{60C8D2A3-1ADE-464A-84D8-267C02763CD5}" dt="2021-10-18T08:08:22.023" v="833" actId="20577"/>
+          <ac:spMkLst>
+            <pc:docMk/>
+            <pc:sldMk cId="4279073654" sldId="341"/>
+            <ac:spMk id="3" creationId="{B8CCE1A7-598C-48E6-94D2-CC07FF1CB111}"/>
+          </ac:spMkLst>
+        </pc:spChg>
+        <pc:spChg chg="add mod">
+          <ac:chgData name="Abel Valko" userId="10a3269d5dfe4f52" providerId="LiveId" clId="{60C8D2A3-1ADE-464A-84D8-267C02763CD5}" dt="2021-10-18T07:49:39.742" v="781" actId="1076"/>
+          <ac:spMkLst>
+            <pc:docMk/>
+            <pc:sldMk cId="4279073654" sldId="341"/>
+            <ac:spMk id="7" creationId="{5BACF8C1-52AA-4B42-BBEC-255FDA5683E4}"/>
+          </ac:spMkLst>
+        </pc:spChg>
+        <pc:spChg chg="add mod">
+          <ac:chgData name="Abel Valko" userId="10a3269d5dfe4f52" providerId="LiveId" clId="{60C8D2A3-1ADE-464A-84D8-267C02763CD5}" dt="2021-10-18T07:49:34.450" v="779" actId="1076"/>
+          <ac:spMkLst>
+            <pc:docMk/>
+            <pc:sldMk cId="4279073654" sldId="341"/>
+            <ac:spMk id="8" creationId="{F193D810-699A-44E6-88E8-8B1F908ECB32}"/>
+          </ac:spMkLst>
+        </pc:spChg>
+        <pc:picChg chg="mod">
+          <ac:chgData name="Abel Valko" userId="10a3269d5dfe4f52" providerId="LiveId" clId="{60C8D2A3-1ADE-464A-84D8-267C02763CD5}" dt="2021-10-18T08:08:38.663" v="838" actId="1076"/>
+          <ac:picMkLst>
+            <pc:docMk/>
+            <pc:sldMk cId="4279073654" sldId="341"/>
+            <ac:picMk id="5" creationId="{57D0332D-7ADB-4644-AA35-CE718BB86767}"/>
+          </ac:picMkLst>
+        </pc:picChg>
+        <pc:picChg chg="add mod modCrop">
+          <ac:chgData name="Abel Valko" userId="10a3269d5dfe4f52" providerId="LiveId" clId="{60C8D2A3-1ADE-464A-84D8-267C02763CD5}" dt="2021-10-18T08:08:31.344" v="836" actId="1076"/>
+          <ac:picMkLst>
+            <pc:docMk/>
+            <pc:sldMk cId="4279073654" sldId="341"/>
+            <ac:picMk id="6" creationId="{069B3143-61CB-477C-8B57-0B4A8D4EC21A}"/>
+          </ac:picMkLst>
+        </pc:picChg>
       </pc:sldChg>
       <pc:sldChg chg="del">
         <pc:chgData name="Abel Valko" userId="10a3269d5dfe4f52" providerId="LiveId" clId="{60C8D2A3-1ADE-464A-84D8-267C02763CD5}" dt="2021-10-17T12:50:00.346" v="3" actId="47"/>
@@ -331,6 +487,28 @@
 </pc:chgInfo>
 </file>
 
+<file path=ppt/comments/modernComment_155_FF0D7B76.xml><?xml version="1.0" encoding="utf-8"?>
+<p188:cmLst xmlns:a="http://schemas.openxmlformats.org/drawingml/2006/main" xmlns:r="http://schemas.openxmlformats.org/officeDocument/2006/relationships" xmlns:p188="http://schemas.microsoft.com/office/powerpoint/2018/8/main">
+  <p188:cm id="{CC9BBAF3-C6AB-4C2F-919C-A188AE3EACF8}" authorId="{DD8B113B-01EE-D7C5-3D76-082683B119F2}" created="2021-10-18T07:41:07.849">
+    <pc:sldMkLst xmlns:pc="http://schemas.microsoft.com/office/powerpoint/2013/main/command">
+      <pc:docMk/>
+      <pc:sldMk cId="4202781665" sldId="340"/>
+    </pc:sldMkLst>
+    <p188:txBody>
+      <a:bodyPr/>
+      <a:lstStyle/>
+      <a:p>
+        <a:r>
+          <a:rPr lang="en-GB"/>
+          <a:t>Not quite sure..
+</a:t>
+        </a:r>
+      </a:p>
+    </p188:txBody>
+  </p188:cm>
+</p188:cmLst>
+</file>
+
 <file path=ppt/handoutMasters/handoutMaster1.xml><?xml version="1.0" encoding="utf-8"?>
 <p:handoutMaster xmlns:a="http://schemas.openxmlformats.org/drawingml/2006/main" xmlns:r="http://schemas.openxmlformats.org/officeDocument/2006/relationships" xmlns:p="http://schemas.openxmlformats.org/presentationml/2006/main">
   <p:cSld>
@@ -425,7 +603,7 @@
           <a:p>
             <a:fld id="{BB37BDEB-D08A-4BCC-82C3-65677B6346BB}" type="datetimeFigureOut">
               <a:rPr lang="en-US" smtClean="0"/>
-              <a:t>10/17/2021</a:t>
+              <a:t>10/18/2021</a:t>
             </a:fld>
             <a:endParaRPr lang="en-US"/>
           </a:p>
@@ -602,7 +780,7 @@
           <a:p>
             <a:fld id="{D64182BB-4E27-4552-8EE4-33C8EF731305}" type="datetimeFigureOut">
               <a:rPr lang="en-US" smtClean="0"/>
-              <a:t>10/17/2021</a:t>
+              <a:t>10/18/2021</a:t>
             </a:fld>
             <a:endParaRPr lang="en-US"/>
           </a:p>
@@ -1107,7 +1285,7 @@
           <a:p>
             <a:fld id="{ED291B17-9318-49DB-B28B-6E5994AE9581}" type="datetime1">
               <a:rPr lang="en-US" smtClean="0"/>
-              <a:t>10/17/2021</a:t>
+              <a:t>10/18/2021</a:t>
             </a:fld>
             <a:endParaRPr lang="en-US" dirty="0"/>
           </a:p>
@@ -1266,7 +1444,7 @@
           <a:p>
             <a:fld id="{4EDE50D6-574B-40AF-946F-D52A04ADE379}" type="datetime1">
               <a:rPr lang="en-US" smtClean="0"/>
-              <a:t>10/17/2021</a:t>
+              <a:t>10/18/2021</a:t>
             </a:fld>
             <a:endParaRPr lang="en-US" dirty="0"/>
           </a:p>
@@ -1678,7 +1856,7 @@
           <a:p>
             <a:fld id="{4EDE50D6-574B-40AF-946F-D52A04ADE379}" type="datetime1">
               <a:rPr lang="en-US" smtClean="0"/>
-              <a:t>10/17/2021</a:t>
+              <a:t>10/18/2021</a:t>
             </a:fld>
             <a:endParaRPr lang="en-US" dirty="0"/>
           </a:p>
@@ -2154,7 +2332,7 @@
           <a:p>
             <a:fld id="{4EDE50D6-574B-40AF-946F-D52A04ADE379}" type="datetime1">
               <a:rPr lang="en-US" smtClean="0"/>
-              <a:t>10/17/2021</a:t>
+              <a:t>10/18/2021</a:t>
             </a:fld>
             <a:endParaRPr lang="en-US" dirty="0"/>
           </a:p>
@@ -2603,7 +2781,7 @@
           <a:p>
             <a:fld id="{4EDE50D6-574B-40AF-946F-D52A04ADE379}" type="datetime1">
               <a:rPr lang="en-US" smtClean="0"/>
-              <a:t>10/17/2021</a:t>
+              <a:t>10/18/2021</a:t>
             </a:fld>
             <a:endParaRPr lang="en-US" dirty="0"/>
           </a:p>
@@ -2835,7 +3013,7 @@
           <a:p>
             <a:fld id="{4EDE50D6-574B-40AF-946F-D52A04ADE379}" type="datetime1">
               <a:rPr lang="en-US" noProof="0" smtClean="0"/>
-              <a:t>10/17/2021</a:t>
+              <a:t>10/18/2021</a:t>
             </a:fld>
             <a:endParaRPr lang="en-US" noProof="0"/>
           </a:p>
@@ -3533,7 +3711,7 @@
           <a:p>
             <a:fld id="{4EDE50D6-574B-40AF-946F-D52A04ADE379}" type="datetime1">
               <a:rPr lang="en-US" noProof="0" smtClean="0"/>
-              <a:t>10/17/2021</a:t>
+              <a:t>10/18/2021</a:t>
             </a:fld>
             <a:endParaRPr lang="en-US" noProof="0"/>
           </a:p>
@@ -3890,7 +4068,7 @@
           <a:p>
             <a:fld id="{4EDE50D6-574B-40AF-946F-D52A04ADE379}" type="datetime1">
               <a:rPr lang="en-US" noProof="0" smtClean="0"/>
-              <a:t>10/17/2021</a:t>
+              <a:t>10/18/2021</a:t>
             </a:fld>
             <a:endParaRPr lang="en-US" noProof="0"/>
           </a:p>
@@ -4452,7 +4630,7 @@
           <a:p>
             <a:fld id="{78DD82B9-B8EE-4375-B6FF-88FA6ABB15D9}" type="datetime1">
               <a:rPr lang="en-US" smtClean="0"/>
-              <a:t>10/17/2021</a:t>
+              <a:t>10/18/2021</a:t>
             </a:fld>
             <a:endParaRPr lang="en-US" dirty="0"/>
           </a:p>
@@ -4800,7 +4978,7 @@
           <a:p>
             <a:fld id="{78DD82B9-B8EE-4375-B6FF-88FA6ABB15D9}" type="datetime1">
               <a:rPr lang="en-US" smtClean="0"/>
-              <a:t>10/17/2021</a:t>
+              <a:t>10/18/2021</a:t>
             </a:fld>
             <a:endParaRPr lang="en-US" dirty="0"/>
           </a:p>
@@ -5203,7 +5381,7 @@
           <a:p>
             <a:fld id="{B2497495-0637-405E-AE64-5CC7506D51F5}" type="datetime1">
               <a:rPr lang="en-US" smtClean="0"/>
-              <a:t>10/17/2021</a:t>
+              <a:t>10/18/2021</a:t>
             </a:fld>
             <a:endParaRPr lang="en-US" dirty="0"/>
           </a:p>
@@ -5496,7 +5674,7 @@
           <a:p>
             <a:fld id="{7BFFD690-9426-415D-8B65-26881E07B2D4}" type="datetime1">
               <a:rPr lang="en-US" smtClean="0"/>
-              <a:t>10/17/2021</a:t>
+              <a:t>10/18/2021</a:t>
             </a:fld>
             <a:endParaRPr lang="en-US" dirty="0"/>
           </a:p>
@@ -5990,7 +6168,7 @@
           <a:p>
             <a:fld id="{04C4989A-474C-40DE-95B9-011C28B71673}" type="datetime1">
               <a:rPr lang="en-US" smtClean="0"/>
-              <a:t>10/17/2021</a:t>
+              <a:t>10/18/2021</a:t>
             </a:fld>
             <a:endParaRPr lang="en-US" dirty="0"/>
           </a:p>
@@ -6294,7 +6472,7 @@
           <a:p>
             <a:fld id="{5DB4ED54-5B5E-4A04-93D3-5772E3CE3818}" type="datetime1">
               <a:rPr lang="en-US" smtClean="0"/>
-              <a:t>10/17/2021</a:t>
+              <a:t>10/18/2021</a:t>
             </a:fld>
             <a:endParaRPr lang="en-US" dirty="0"/>
           </a:p>
@@ -6481,7 +6659,7 @@
           <a:p>
             <a:fld id="{4EDE50D6-574B-40AF-946F-D52A04ADE379}" type="datetime1">
               <a:rPr lang="en-US" smtClean="0"/>
-              <a:t>10/17/2021</a:t>
+              <a:t>10/18/2021</a:t>
             </a:fld>
             <a:endParaRPr lang="en-US" dirty="0"/>
           </a:p>
@@ -6693,7 +6871,7 @@
           <a:p>
             <a:fld id="{4EDE50D6-574B-40AF-946F-D52A04ADE379}" type="datetime1">
               <a:rPr lang="en-US" smtClean="0"/>
-              <a:t>10/17/2021</a:t>
+              <a:t>10/18/2021</a:t>
             </a:fld>
             <a:endParaRPr lang="en-US" dirty="0"/>
           </a:p>
@@ -7125,7 +7303,7 @@
           <a:p>
             <a:fld id="{ED291B17-9318-49DB-B28B-6E5994AE9581}" type="datetime1">
               <a:rPr lang="en-US" smtClean="0"/>
-              <a:t>10/17/2021</a:t>
+              <a:t>10/18/2021</a:t>
             </a:fld>
             <a:endParaRPr lang="en-US" dirty="0"/>
           </a:p>
@@ -7815,15 +7993,90 @@
             <p:ph idx="1"/>
           </p:nvPr>
         </p:nvSpPr>
-        <p:spPr/>
-        <p:txBody>
-          <a:bodyPr/>
-          <a:lstStyle/>
-          <a:p>
-            <a:endParaRPr lang="en-GB"/>
-          </a:p>
-        </p:txBody>
-      </p:sp>
+        <p:spPr>
+          <a:xfrm>
+            <a:off x="581193" y="2517913"/>
+            <a:ext cx="6296685" cy="3210352"/>
+          </a:xfrm>
+        </p:spPr>
+        <p:txBody>
+          <a:bodyPr>
+            <a:normAutofit lnSpcReduction="10000"/>
+          </a:bodyPr>
+          <a:lstStyle/>
+          <a:p>
+            <a:r>
+              <a:rPr lang="en-GB" dirty="0"/>
+              <a:t>Iris accuracy: 89.8%</a:t>
+            </a:r>
+          </a:p>
+          <a:p>
+            <a:r>
+              <a:rPr lang="en-GB" dirty="0"/>
+              <a:t>Iris Std: 4.05</a:t>
+            </a:r>
+          </a:p>
+          <a:p>
+            <a:r>
+              <a:rPr lang="en-GB" dirty="0"/>
+              <a:t>Vowel accuracy: 65.4%</a:t>
+            </a:r>
+          </a:p>
+          <a:p>
+            <a:r>
+              <a:rPr lang="en-GB" dirty="0"/>
+              <a:t>Vowel Std: 3.87</a:t>
+            </a:r>
+          </a:p>
+          <a:p>
+            <a:endParaRPr lang="en-GB" dirty="0"/>
+          </a:p>
+          <a:p>
+            <a:r>
+              <a:rPr lang="en-GB" dirty="0"/>
+              <a:t>Feature independence assumed – We assume the features are not correlated. E.g., the 2 dimensions of the Iris feature set don’t tell us anything about each other. This assumption can be successfully made even with some weak dependence.</a:t>
+            </a:r>
+          </a:p>
+          <a:p>
+            <a:endParaRPr lang="en-GB" dirty="0"/>
+          </a:p>
+          <a:p>
+            <a:endParaRPr lang="en-GB" dirty="0"/>
+          </a:p>
+          <a:p>
+            <a:endParaRPr lang="en-GB" dirty="0"/>
+          </a:p>
+        </p:txBody>
+      </p:sp>
+      <p:pic>
+        <p:nvPicPr>
+          <p:cNvPr id="5" name="Picture 4" descr="Chart, scatter chart&#10;&#10;Description automatically generated">
+            <a:extLst>
+              <a:ext uri="{FF2B5EF4-FFF2-40B4-BE49-F238E27FC236}">
+                <a16:creationId xmlns:a16="http://schemas.microsoft.com/office/drawing/2014/main" id="{57D0332D-7ADB-4644-AA35-CE718BB86767}"/>
+              </a:ext>
+            </a:extLst>
+          </p:cNvPr>
+          <p:cNvPicPr>
+            <a:picLocks noChangeAspect="1"/>
+          </p:cNvPicPr>
+          <p:nvPr/>
+        </p:nvPicPr>
+        <p:blipFill rotWithShape="1">
+          <a:blip r:embed="rId2"/>
+          <a:srcRect l="6341" t="10108" r="6024" b="3687"/>
+          <a:stretch/>
+        </p:blipFill>
+        <p:spPr>
+          <a:xfrm>
+            <a:off x="7063408" y="1944560"/>
+            <a:ext cx="5128592" cy="3783705"/>
+          </a:xfrm>
+          <a:prstGeom prst="rect">
+            <a:avLst/>
+          </a:prstGeom>
+        </p:spPr>
+      </p:pic>
     </p:spTree>
     <p:extLst>
       <p:ext uri="{BB962C8B-B14F-4D97-AF65-F5344CB8AC3E}">
@@ -7834,6 +8087,266 @@
   <p:clrMapOvr>
     <a:masterClrMapping/>
   </p:clrMapOvr>
+</p:sld>
+</file>
+
+<file path=ppt/slides/slide3.xml><?xml version="1.0" encoding="utf-8"?>
+<p:sld xmlns:a="http://schemas.openxmlformats.org/drawingml/2006/main" xmlns:r="http://schemas.openxmlformats.org/officeDocument/2006/relationships" xmlns:p="http://schemas.openxmlformats.org/presentationml/2006/main">
+  <p:cSld>
+    <p:spTree>
+      <p:nvGrpSpPr>
+        <p:cNvPr id="1" name=""/>
+        <p:cNvGrpSpPr/>
+        <p:nvPr/>
+      </p:nvGrpSpPr>
+      <p:grpSpPr>
+        <a:xfrm>
+          <a:off x="0" y="0"/>
+          <a:ext cx="0" cy="0"/>
+          <a:chOff x="0" y="0"/>
+          <a:chExt cx="0" cy="0"/>
+        </a:xfrm>
+      </p:grpSpPr>
+      <p:sp>
+        <p:nvSpPr>
+          <p:cNvPr id="2" name="Title 1">
+            <a:extLst>
+              <a:ext uri="{FF2B5EF4-FFF2-40B4-BE49-F238E27FC236}">
+                <a16:creationId xmlns:a16="http://schemas.microsoft.com/office/drawing/2014/main" id="{13DA2BD8-448F-474C-BD37-54043ABB7369}"/>
+              </a:ext>
+            </a:extLst>
+          </p:cNvPr>
+          <p:cNvSpPr>
+            <a:spLocks noGrp="1"/>
+          </p:cNvSpPr>
+          <p:nvPr>
+            <p:ph type="title"/>
+          </p:nvPr>
+        </p:nvSpPr>
+        <p:spPr/>
+        <p:txBody>
+          <a:bodyPr/>
+          <a:lstStyle/>
+          <a:p>
+            <a:r>
+              <a:rPr lang="en-GB" dirty="0"/>
+              <a:t>Improving Iris boundary</a:t>
+            </a:r>
+          </a:p>
+        </p:txBody>
+      </p:sp>
+      <p:sp>
+        <p:nvSpPr>
+          <p:cNvPr id="3" name="Content Placeholder 2">
+            <a:extLst>
+              <a:ext uri="{FF2B5EF4-FFF2-40B4-BE49-F238E27FC236}">
+                <a16:creationId xmlns:a16="http://schemas.microsoft.com/office/drawing/2014/main" id="{B8CCE1A7-598C-48E6-94D2-CC07FF1CB111}"/>
+              </a:ext>
+            </a:extLst>
+          </p:cNvPr>
+          <p:cNvSpPr>
+            <a:spLocks noGrp="1"/>
+          </p:cNvSpPr>
+          <p:nvPr>
+            <p:ph idx="1"/>
+          </p:nvPr>
+        </p:nvSpPr>
+        <p:spPr>
+          <a:xfrm>
+            <a:off x="581192" y="393148"/>
+            <a:ext cx="6296685" cy="3210352"/>
+          </a:xfrm>
+        </p:spPr>
+        <p:txBody>
+          <a:bodyPr>
+            <a:normAutofit/>
+          </a:bodyPr>
+          <a:lstStyle/>
+          <a:p>
+            <a:endParaRPr lang="en-GB" dirty="0"/>
+          </a:p>
+          <a:p>
+            <a:endParaRPr lang="en-GB" dirty="0"/>
+          </a:p>
+          <a:p>
+            <a:r>
+              <a:rPr lang="en-GB" dirty="0"/>
+              <a:t>MAP could be used instead of ML estimate?</a:t>
+            </a:r>
+          </a:p>
+          <a:p>
+            <a:r>
+              <a:rPr lang="en-GB" dirty="0"/>
+              <a:t>Clean up outliers</a:t>
+            </a:r>
+          </a:p>
+          <a:p>
+            <a:r>
+              <a:rPr lang="en-GB" dirty="0"/>
+              <a:t>Decision tree does not seem better</a:t>
+            </a:r>
+          </a:p>
+        </p:txBody>
+      </p:sp>
+      <p:pic>
+        <p:nvPicPr>
+          <p:cNvPr id="5" name="Picture 4" descr="Chart, scatter chart&#10;&#10;Description automatically generated">
+            <a:extLst>
+              <a:ext uri="{FF2B5EF4-FFF2-40B4-BE49-F238E27FC236}">
+                <a16:creationId xmlns:a16="http://schemas.microsoft.com/office/drawing/2014/main" id="{57D0332D-7ADB-4644-AA35-CE718BB86767}"/>
+              </a:ext>
+            </a:extLst>
+          </p:cNvPr>
+          <p:cNvPicPr>
+            <a:picLocks noChangeAspect="1"/>
+          </p:cNvPicPr>
+          <p:nvPr/>
+        </p:nvPicPr>
+        <p:blipFill rotWithShape="1">
+          <a:blip r:embed="rId3"/>
+          <a:srcRect l="6341" t="10108" r="6024" b="3687"/>
+          <a:stretch/>
+        </p:blipFill>
+        <p:spPr>
+          <a:xfrm>
+            <a:off x="7597921" y="3365595"/>
+            <a:ext cx="4431907" cy="3269714"/>
+          </a:xfrm>
+          <a:prstGeom prst="rect">
+            <a:avLst/>
+          </a:prstGeom>
+        </p:spPr>
+      </p:pic>
+      <p:pic>
+        <p:nvPicPr>
+          <p:cNvPr id="6" name="Picture 5" descr="Chart, scatter chart&#10;&#10;Description automatically generated">
+            <a:extLst>
+              <a:ext uri="{FF2B5EF4-FFF2-40B4-BE49-F238E27FC236}">
+                <a16:creationId xmlns:a16="http://schemas.microsoft.com/office/drawing/2014/main" id="{069B3143-61CB-477C-8B57-0B4A8D4EC21A}"/>
+              </a:ext>
+            </a:extLst>
+          </p:cNvPr>
+          <p:cNvPicPr>
+            <a:picLocks noChangeAspect="1"/>
+          </p:cNvPicPr>
+          <p:nvPr/>
+        </p:nvPicPr>
+        <p:blipFill rotWithShape="1">
+          <a:blip r:embed="rId4"/>
+          <a:srcRect l="5271" t="9676" r="7092" b="4118"/>
+          <a:stretch/>
+        </p:blipFill>
+        <p:spPr>
+          <a:xfrm>
+            <a:off x="1186580" y="3365596"/>
+            <a:ext cx="4431906" cy="3269714"/>
+          </a:xfrm>
+          <a:prstGeom prst="rect">
+            <a:avLst/>
+          </a:prstGeom>
+        </p:spPr>
+      </p:pic>
+      <p:sp>
+        <p:nvSpPr>
+          <p:cNvPr id="7" name="TextBox 6">
+            <a:extLst>
+              <a:ext uri="{FF2B5EF4-FFF2-40B4-BE49-F238E27FC236}">
+                <a16:creationId xmlns:a16="http://schemas.microsoft.com/office/drawing/2014/main" id="{5BACF8C1-52AA-4B42-BBEC-255FDA5683E4}"/>
+              </a:ext>
+            </a:extLst>
+          </p:cNvPr>
+          <p:cNvSpPr txBox="1"/>
+          <p:nvPr/>
+        </p:nvSpPr>
+        <p:spPr>
+          <a:xfrm>
+            <a:off x="1722140" y="6464852"/>
+            <a:ext cx="2662843" cy="369332"/>
+          </a:xfrm>
+          <a:prstGeom prst="rect">
+            <a:avLst/>
+          </a:prstGeom>
+          <a:noFill/>
+        </p:spPr>
+        <p:txBody>
+          <a:bodyPr wrap="square" rtlCol="0">
+            <a:spAutoFit/>
+          </a:bodyPr>
+          <a:lstStyle/>
+          <a:p>
+            <a:pPr algn="ctr"/>
+            <a:r>
+              <a:rPr lang="en-GB" dirty="0">
+                <a:solidFill>
+                  <a:schemeClr val="tx1">
+                    <a:lumMod val="75000"/>
+                    <a:lumOff val="25000"/>
+                  </a:schemeClr>
+                </a:solidFill>
+              </a:rPr>
+              <a:t>Decision Tree Classifier</a:t>
+            </a:r>
+          </a:p>
+        </p:txBody>
+      </p:sp>
+      <p:sp>
+        <p:nvSpPr>
+          <p:cNvPr id="8" name="TextBox 7">
+            <a:extLst>
+              <a:ext uri="{FF2B5EF4-FFF2-40B4-BE49-F238E27FC236}">
+                <a16:creationId xmlns:a16="http://schemas.microsoft.com/office/drawing/2014/main" id="{F193D810-699A-44E6-88E8-8B1F908ECB32}"/>
+              </a:ext>
+            </a:extLst>
+          </p:cNvPr>
+          <p:cNvSpPr txBox="1"/>
+          <p:nvPr/>
+        </p:nvSpPr>
+        <p:spPr>
+          <a:xfrm>
+            <a:off x="8003878" y="6443179"/>
+            <a:ext cx="2662843" cy="369332"/>
+          </a:xfrm>
+          <a:prstGeom prst="rect">
+            <a:avLst/>
+          </a:prstGeom>
+          <a:noFill/>
+        </p:spPr>
+        <p:txBody>
+          <a:bodyPr wrap="square" rtlCol="0">
+            <a:spAutoFit/>
+          </a:bodyPr>
+          <a:lstStyle/>
+          <a:p>
+            <a:pPr algn="ctr"/>
+            <a:r>
+              <a:rPr lang="en-GB" dirty="0">
+                <a:solidFill>
+                  <a:schemeClr val="tx1">
+                    <a:lumMod val="75000"/>
+                    <a:lumOff val="25000"/>
+                  </a:schemeClr>
+                </a:solidFill>
+              </a:rPr>
+              <a:t>Naïve Bayes Classifier</a:t>
+            </a:r>
+          </a:p>
+        </p:txBody>
+      </p:sp>
+    </p:spTree>
+    <p:extLst>
+      <p:ext uri="{BB962C8B-B14F-4D97-AF65-F5344CB8AC3E}">
+        <p14:creationId xmlns:p14="http://schemas.microsoft.com/office/powerpoint/2010/main" val="4279073654"/>
+      </p:ext>
+    </p:extLst>
+  </p:cSld>
+  <p:clrMapOvr>
+    <a:masterClrMapping/>
+  </p:clrMapOvr>
+  <p:extLst>
+    <p:ext uri="{6950BFC3-D8DA-4A85-94F7-54DA5524770B}">
+      <p188:commentRel xmlns:p188="http://schemas.microsoft.com/office/powerpoint/2018/8/main" r:id="rId2"/>
+    </p:ext>
+  </p:extLst>
 </p:sld>
 </file>
 
@@ -8693,24 +9206,6 @@
 </file>
 
 <file path=customXml/item1.xml><?xml version="1.0" encoding="utf-8"?>
-<p:properties xmlns:p="http://schemas.microsoft.com/office/2006/metadata/properties" xmlns:xsi="http://www.w3.org/2001/XMLSchema-instance" xmlns:pc="http://schemas.microsoft.com/office/infopath/2007/PartnerControls">
-  <documentManagement>
-    <Status xmlns="71af3243-3dd4-4a8d-8c0d-dd76da1f02a5">Not started</Status>
-    <MediaServiceKeyPoints xmlns="71af3243-3dd4-4a8d-8c0d-dd76da1f02a5" xsi:nil="true"/>
-  </documentManagement>
-</p:properties>
-</file>
-
-<file path=customXml/item2.xml><?xml version="1.0" encoding="utf-8"?>
-<?mso-contentType ?>
-<FormTemplates xmlns="http://schemas.microsoft.com/sharepoint/v3/contenttype/forms">
-  <Display>DocumentLibraryForm</Display>
-  <Edit>DocumentLibraryForm</Edit>
-  <New>DocumentLibraryForm</New>
-</FormTemplates>
-</file>
-
-<file path=customXml/item3.xml><?xml version="1.0" encoding="utf-8"?>
 <ct:contentTypeSchema xmlns:ct="http://schemas.microsoft.com/office/2006/metadata/contentType" xmlns:ma="http://schemas.microsoft.com/office/2006/metadata/properties/metaAttributes" ct:_="" ma:_="" ma:contentTypeName="Document" ma:contentTypeID="0x01010079F111ED35F8CC479449609E8A0923A6" ma:contentTypeVersion="12" ma:contentTypeDescription="Create a new document." ma:contentTypeScope="" ma:versionID="fa6e671f1cd7e4d96ff9652be322dd5e">
   <xsd:schema xmlns:xsd="http://www.w3.org/2001/XMLSchema" xmlns:xs="http://www.w3.org/2001/XMLSchema" xmlns:p="http://schemas.microsoft.com/office/2006/metadata/properties" xmlns:ns2="71af3243-3dd4-4a8d-8c0d-dd76da1f02a5" xmlns:ns3="16c05727-aa75-4e4a-9b5f-8a80a1165891" targetNamespace="http://schemas.microsoft.com/office/2006/metadata/properties" ma:root="true" ma:fieldsID="4e2496f70b101db0b8013f30a071bbf7" ns2:_="" ns3:_="">
     <xsd:import namespace="71af3243-3dd4-4a8d-8c0d-dd76da1f02a5"/>
@@ -8931,25 +9426,25 @@
 </ct:contentTypeSchema>
 </file>
 
-<file path=customXml/itemProps1.xml><?xml version="1.0" encoding="utf-8"?>
-<ds:datastoreItem xmlns:ds="http://schemas.openxmlformats.org/officeDocument/2006/customXml" ds:itemID="{ADC43B05-D266-4257-98DE-FF9D8CEDAE76}">
-  <ds:schemaRefs>
-    <ds:schemaRef ds:uri="http://schemas.microsoft.com/office/2006/metadata/properties"/>
-    <ds:schemaRef ds:uri="http://schemas.microsoft.com/office/infopath/2007/PartnerControls"/>
-    <ds:schemaRef ds:uri="71af3243-3dd4-4a8d-8c0d-dd76da1f02a5"/>
-  </ds:schemaRefs>
-</ds:datastoreItem>
+<file path=customXml/item2.xml><?xml version="1.0" encoding="utf-8"?>
+<?mso-contentType ?>
+<FormTemplates xmlns="http://schemas.microsoft.com/sharepoint/v3/contenttype/forms">
+  <Display>DocumentLibraryForm</Display>
+  <Edit>DocumentLibraryForm</Edit>
+  <New>DocumentLibraryForm</New>
+</FormTemplates>
 </file>
 
-<file path=customXml/itemProps2.xml><?xml version="1.0" encoding="utf-8"?>
-<ds:datastoreItem xmlns:ds="http://schemas.openxmlformats.org/officeDocument/2006/customXml" ds:itemID="{8435A0B9-5F49-415F-9BEE-591FDACE98D1}">
-  <ds:schemaRefs>
-    <ds:schemaRef ds:uri="http://schemas.microsoft.com/sharepoint/v3/contenttype/forms"/>
-  </ds:schemaRefs>
-</ds:datastoreItem>
+<file path=customXml/item3.xml><?xml version="1.0" encoding="utf-8"?>
+<p:properties xmlns:p="http://schemas.microsoft.com/office/2006/metadata/properties" xmlns:xsi="http://www.w3.org/2001/XMLSchema-instance" xmlns:pc="http://schemas.microsoft.com/office/infopath/2007/PartnerControls">
+  <documentManagement>
+    <Status xmlns="71af3243-3dd4-4a8d-8c0d-dd76da1f02a5">Not started</Status>
+    <MediaServiceKeyPoints xmlns="71af3243-3dd4-4a8d-8c0d-dd76da1f02a5" xsi:nil="true"/>
+  </documentManagement>
+</p:properties>
 </file>
 
-<file path=customXml/itemProps3.xml><?xml version="1.0" encoding="utf-8"?>
+<file path=customXml/itemProps1.xml><?xml version="1.0" encoding="utf-8"?>
 <ds:datastoreItem xmlns:ds="http://schemas.openxmlformats.org/officeDocument/2006/customXml" ds:itemID="{D76AEDE5-E9AF-4E9F-97C3-19B848D35AB4}">
   <ds:schemaRefs>
     <ds:schemaRef ds:uri="http://schemas.microsoft.com/office/2006/metadata/contentType"/>
@@ -8966,4 +9461,22 @@
     <ds:schemaRef ds:uri="http://schemas.microsoft.com/internal/obd"/>
   </ds:schemaRefs>
 </ds:datastoreItem>
+</file>
+
+<file path=customXml/itemProps2.xml><?xml version="1.0" encoding="utf-8"?>
+<ds:datastoreItem xmlns:ds="http://schemas.openxmlformats.org/officeDocument/2006/customXml" ds:itemID="{8435A0B9-5F49-415F-9BEE-591FDACE98D1}">
+  <ds:schemaRefs>
+    <ds:schemaRef ds:uri="http://schemas.microsoft.com/sharepoint/v3/contenttype/forms"/>
+  </ds:schemaRefs>
+</ds:datastoreItem>
+</file>
+
+<file path=customXml/itemProps3.xml><?xml version="1.0" encoding="utf-8"?>
+<ds:datastoreItem xmlns:ds="http://schemas.openxmlformats.org/officeDocument/2006/customXml" ds:itemID="{ADC43B05-D266-4257-98DE-FF9D8CEDAE76}">
+  <ds:schemaRefs>
+    <ds:schemaRef ds:uri="http://schemas.microsoft.com/office/2006/metadata/properties"/>
+    <ds:schemaRef ds:uri="http://schemas.microsoft.com/office/infopath/2007/PartnerControls"/>
+    <ds:schemaRef ds:uri="71af3243-3dd4-4a8d-8c0d-dd76da1f02a5"/>
+  </ds:schemaRefs>
+</ds:datastoreItem>
 </file>
</xml_diff>

<commit_message>
Added full results and discussion
</commit_message>
<xml_diff>
--- a/Bayes_Boosting_presentation.pptx
+++ b/Bayes_Boosting_presentation.pptx
@@ -5,15 +5,25 @@
     <p:sldMasterId id="2147483685" r:id="rId4"/>
   </p:sldMasterIdLst>
   <p:notesMasterIdLst>
-    <p:notesMasterId r:id="rId8"/>
+    <p:notesMasterId r:id="rId18"/>
   </p:notesMasterIdLst>
   <p:handoutMasterIdLst>
-    <p:handoutMasterId r:id="rId9"/>
+    <p:handoutMasterId r:id="rId19"/>
   </p:handoutMasterIdLst>
   <p:sldIdLst>
     <p:sldId id="338" r:id="rId5"/>
     <p:sldId id="339" r:id="rId6"/>
     <p:sldId id="341" r:id="rId7"/>
+    <p:sldId id="343" r:id="rId8"/>
+    <p:sldId id="352" r:id="rId9"/>
+    <p:sldId id="344" r:id="rId10"/>
+    <p:sldId id="345" r:id="rId11"/>
+    <p:sldId id="347" r:id="rId12"/>
+    <p:sldId id="349" r:id="rId13"/>
+    <p:sldId id="350" r:id="rId14"/>
+    <p:sldId id="351" r:id="rId15"/>
+    <p:sldId id="353" r:id="rId16"/>
+    <p:sldId id="354" r:id="rId17"/>
   </p:sldIdLst>
   <p:sldSz cx="12192000" cy="6858000"/>
   <p:notesSz cx="6858000" cy="9144000"/>
@@ -132,7 +142,7 @@
 <file path=ppt/revisionInfo.xml><?xml version="1.0" encoding="utf-8"?>
 <p1510:revInfo xmlns:a="http://schemas.openxmlformats.org/drawingml/2006/main" xmlns:r="http://schemas.openxmlformats.org/officeDocument/2006/relationships" xmlns:p1510="http://schemas.microsoft.com/office/powerpoint/2015/10/main">
   <p1510:revLst>
-    <p1510:client id="{60C8D2A3-1ADE-464A-84D8-267C02763CD5}" v="5" dt="2021-10-18T07:49:16.958"/>
+    <p1510:client id="{60C8D2A3-1ADE-464A-84D8-267C02763CD5}" v="10" dt="2021-10-20T12:35:56.620"/>
   </p1510:revLst>
 </p1510:revInfo>
 </file>
@@ -141,8 +151,8 @@
 <pc:chgInfo xmlns:a="http://schemas.openxmlformats.org/drawingml/2006/main" xmlns:r="http://schemas.openxmlformats.org/officeDocument/2006/relationships" xmlns:ac="http://schemas.microsoft.com/office/drawing/2013/main/command" xmlns:pc="http://schemas.microsoft.com/office/powerpoint/2013/main/command">
   <pc:docChgLst>
     <pc:chgData name="Abel Valko" userId="10a3269d5dfe4f52" providerId="LiveId" clId="{60C8D2A3-1ADE-464A-84D8-267C02763CD5}"/>
-    <pc:docChg chg="undo custSel addSld delSld modSld sldOrd">
-      <pc:chgData name="Abel Valko" userId="10a3269d5dfe4f52" providerId="LiveId" clId="{60C8D2A3-1ADE-464A-84D8-267C02763CD5}" dt="2021-10-18T08:08:38.663" v="838" actId="1076"/>
+    <pc:docChg chg="undo redo custSel addSld delSld modSld sldOrd">
+      <pc:chgData name="Abel Valko" userId="10a3269d5dfe4f52" providerId="LiveId" clId="{60C8D2A3-1ADE-464A-84D8-267C02763CD5}" dt="2021-10-20T12:45:40.839" v="2497" actId="20577"/>
       <pc:docMkLst>
         <pc:docMk/>
       </pc:docMkLst>
@@ -379,13 +389,13 @@
         </pc:picChg>
       </pc:sldChg>
       <pc:sldChg chg="addSp modSp add mod">
-        <pc:chgData name="Abel Valko" userId="10a3269d5dfe4f52" providerId="LiveId" clId="{60C8D2A3-1ADE-464A-84D8-267C02763CD5}" dt="2021-10-18T08:08:38.663" v="838" actId="1076"/>
+        <pc:chgData name="Abel Valko" userId="10a3269d5dfe4f52" providerId="LiveId" clId="{60C8D2A3-1ADE-464A-84D8-267C02763CD5}" dt="2021-10-20T09:07:44.527" v="922" actId="20577"/>
         <pc:sldMkLst>
           <pc:docMk/>
           <pc:sldMk cId="4279073654" sldId="341"/>
         </pc:sldMkLst>
         <pc:spChg chg="mod">
-          <ac:chgData name="Abel Valko" userId="10a3269d5dfe4f52" providerId="LiveId" clId="{60C8D2A3-1ADE-464A-84D8-267C02763CD5}" dt="2021-10-18T08:08:22.023" v="833" actId="20577"/>
+          <ac:chgData name="Abel Valko" userId="10a3269d5dfe4f52" providerId="LiveId" clId="{60C8D2A3-1ADE-464A-84D8-267C02763CD5}" dt="2021-10-20T09:07:44.527" v="922" actId="20577"/>
           <ac:spMkLst>
             <pc:docMk/>
             <pc:sldMk cId="4279073654" sldId="341"/>
@@ -432,12 +442,74 @@
           <pc:sldMk cId="2435097111" sldId="342"/>
         </pc:sldMkLst>
       </pc:sldChg>
+      <pc:sldChg chg="modSp new del mod">
+        <pc:chgData name="Abel Valko" userId="10a3269d5dfe4f52" providerId="LiveId" clId="{60C8D2A3-1ADE-464A-84D8-267C02763CD5}" dt="2021-10-20T08:59:25.876" v="849" actId="47"/>
+        <pc:sldMkLst>
+          <pc:docMk/>
+          <pc:sldMk cId="3118734576" sldId="342"/>
+        </pc:sldMkLst>
+        <pc:spChg chg="mod">
+          <ac:chgData name="Abel Valko" userId="10a3269d5dfe4f52" providerId="LiveId" clId="{60C8D2A3-1ADE-464A-84D8-267C02763CD5}" dt="2021-10-20T08:59:02.588" v="847" actId="20577"/>
+          <ac:spMkLst>
+            <pc:docMk/>
+            <pc:sldMk cId="3118734576" sldId="342"/>
+            <ac:spMk id="2" creationId="{92A6F945-34E6-4766-A6E7-4D9D3AC4F0C9}"/>
+          </ac:spMkLst>
+        </pc:spChg>
+      </pc:sldChg>
       <pc:sldChg chg="del">
         <pc:chgData name="Abel Valko" userId="10a3269d5dfe4f52" providerId="LiveId" clId="{60C8D2A3-1ADE-464A-84D8-267C02763CD5}" dt="2021-10-17T12:50:01.656" v="10" actId="47"/>
         <pc:sldMkLst>
           <pc:docMk/>
           <pc:sldMk cId="883680396" sldId="343"/>
         </pc:sldMkLst>
+      </pc:sldChg>
+      <pc:sldChg chg="modSp new mod">
+        <pc:chgData name="Abel Valko" userId="10a3269d5dfe4f52" providerId="LiveId" clId="{60C8D2A3-1ADE-464A-84D8-267C02763CD5}" dt="2021-10-20T09:17:24.757" v="1195" actId="20577"/>
+        <pc:sldMkLst>
+          <pc:docMk/>
+          <pc:sldMk cId="1455956935" sldId="343"/>
+        </pc:sldMkLst>
+        <pc:spChg chg="mod">
+          <ac:chgData name="Abel Valko" userId="10a3269d5dfe4f52" providerId="LiveId" clId="{60C8D2A3-1ADE-464A-84D8-267C02763CD5}" dt="2021-10-20T08:59:31.767" v="864" actId="20577"/>
+          <ac:spMkLst>
+            <pc:docMk/>
+            <pc:sldMk cId="1455956935" sldId="343"/>
+            <ac:spMk id="2" creationId="{B8BE6083-843E-4374-933A-2BE17CAADA82}"/>
+          </ac:spMkLst>
+        </pc:spChg>
+        <pc:spChg chg="mod">
+          <ac:chgData name="Abel Valko" userId="10a3269d5dfe4f52" providerId="LiveId" clId="{60C8D2A3-1ADE-464A-84D8-267C02763CD5}" dt="2021-10-20T09:17:23.764" v="1194" actId="20577"/>
+          <ac:spMkLst>
+            <pc:docMk/>
+            <pc:sldMk cId="1455956935" sldId="343"/>
+            <ac:spMk id="3" creationId="{66130370-2A0B-4DBB-8465-00D3F5B4096E}"/>
+          </ac:spMkLst>
+        </pc:spChg>
+        <pc:spChg chg="mod">
+          <ac:chgData name="Abel Valko" userId="10a3269d5dfe4f52" providerId="LiveId" clId="{60C8D2A3-1ADE-464A-84D8-267C02763CD5}" dt="2021-10-20T08:59:34.810" v="868" actId="20577"/>
+          <ac:spMkLst>
+            <pc:docMk/>
+            <pc:sldMk cId="1455956935" sldId="343"/>
+            <ac:spMk id="4" creationId="{47D7A67B-9E93-47B6-BEC4-A2ADDD7E950C}"/>
+          </ac:spMkLst>
+        </pc:spChg>
+        <pc:spChg chg="mod">
+          <ac:chgData name="Abel Valko" userId="10a3269d5dfe4f52" providerId="LiveId" clId="{60C8D2A3-1ADE-464A-84D8-267C02763CD5}" dt="2021-10-20T09:17:24.757" v="1195" actId="20577"/>
+          <ac:spMkLst>
+            <pc:docMk/>
+            <pc:sldMk cId="1455956935" sldId="343"/>
+            <ac:spMk id="5" creationId="{3535F67E-C81D-4BC4-AB67-D415CE6FE6F7}"/>
+          </ac:spMkLst>
+        </pc:spChg>
+        <pc:spChg chg="mod">
+          <ac:chgData name="Abel Valko" userId="10a3269d5dfe4f52" providerId="LiveId" clId="{60C8D2A3-1ADE-464A-84D8-267C02763CD5}" dt="2021-10-20T09:09:29.117" v="933" actId="20577"/>
+          <ac:spMkLst>
+            <pc:docMk/>
+            <pc:sldMk cId="1455956935" sldId="343"/>
+            <ac:spMk id="6" creationId="{BFE883A1-329B-45CC-AC8E-7EE8784BFA2A}"/>
+          </ac:spMkLst>
+        </pc:spChg>
       </pc:sldChg>
       <pc:sldChg chg="del">
         <pc:chgData name="Abel Valko" userId="10a3269d5dfe4f52" providerId="LiveId" clId="{60C8D2A3-1ADE-464A-84D8-267C02763CD5}" dt="2021-10-17T12:50:01.879" v="11" actId="47"/>
@@ -446,11 +518,128 @@
           <pc:sldMk cId="440266514" sldId="344"/>
         </pc:sldMkLst>
       </pc:sldChg>
+      <pc:sldChg chg="modSp add mod">
+        <pc:chgData name="Abel Valko" userId="10a3269d5dfe4f52" providerId="LiveId" clId="{60C8D2A3-1ADE-464A-84D8-267C02763CD5}" dt="2021-10-20T12:35:07.252" v="1952" actId="20577"/>
+        <pc:sldMkLst>
+          <pc:docMk/>
+          <pc:sldMk cId="1329758991" sldId="344"/>
+        </pc:sldMkLst>
+        <pc:spChg chg="mod">
+          <ac:chgData name="Abel Valko" userId="10a3269d5dfe4f52" providerId="LiveId" clId="{60C8D2A3-1ADE-464A-84D8-267C02763CD5}" dt="2021-10-20T09:17:39.720" v="1199" actId="20577"/>
+          <ac:spMkLst>
+            <pc:docMk/>
+            <pc:sldMk cId="1329758991" sldId="344"/>
+            <ac:spMk id="3" creationId="{66130370-2A0B-4DBB-8465-00D3F5B4096E}"/>
+          </ac:spMkLst>
+        </pc:spChg>
+        <pc:spChg chg="mod">
+          <ac:chgData name="Abel Valko" userId="10a3269d5dfe4f52" providerId="LiveId" clId="{60C8D2A3-1ADE-464A-84D8-267C02763CD5}" dt="2021-10-20T12:35:07.252" v="1952" actId="20577"/>
+          <ac:spMkLst>
+            <pc:docMk/>
+            <pc:sldMk cId="1329758991" sldId="344"/>
+            <ac:spMk id="5" creationId="{3535F67E-C81D-4BC4-AB67-D415CE6FE6F7}"/>
+          </ac:spMkLst>
+        </pc:spChg>
+        <pc:spChg chg="mod">
+          <ac:chgData name="Abel Valko" userId="10a3269d5dfe4f52" providerId="LiveId" clId="{60C8D2A3-1ADE-464A-84D8-267C02763CD5}" dt="2021-10-20T09:27:25.806" v="1825" actId="20577"/>
+          <ac:spMkLst>
+            <pc:docMk/>
+            <pc:sldMk cId="1329758991" sldId="344"/>
+            <ac:spMk id="6" creationId="{BFE883A1-329B-45CC-AC8E-7EE8784BFA2A}"/>
+          </ac:spMkLst>
+        </pc:spChg>
+      </pc:sldChg>
       <pc:sldChg chg="del">
         <pc:chgData name="Abel Valko" userId="10a3269d5dfe4f52" providerId="LiveId" clId="{60C8D2A3-1ADE-464A-84D8-267C02763CD5}" dt="2021-10-17T12:50:02.222" v="13" actId="47"/>
         <pc:sldMkLst>
           <pc:docMk/>
           <pc:sldMk cId="881188039" sldId="345"/>
+        </pc:sldMkLst>
+      </pc:sldChg>
+      <pc:sldChg chg="addSp delSp modSp add mod delCm">
+        <pc:chgData name="Abel Valko" userId="10a3269d5dfe4f52" providerId="LiveId" clId="{60C8D2A3-1ADE-464A-84D8-267C02763CD5}" dt="2021-10-20T12:39:29.452" v="2029" actId="20577"/>
+        <pc:sldMkLst>
+          <pc:docMk/>
+          <pc:sldMk cId="3637565257" sldId="345"/>
+        </pc:sldMkLst>
+        <pc:spChg chg="mod">
+          <ac:chgData name="Abel Valko" userId="10a3269d5dfe4f52" providerId="LiveId" clId="{60C8D2A3-1ADE-464A-84D8-267C02763CD5}" dt="2021-10-20T09:15:26.257" v="1167" actId="20577"/>
+          <ac:spMkLst>
+            <pc:docMk/>
+            <pc:sldMk cId="3637565257" sldId="345"/>
+            <ac:spMk id="2" creationId="{13DA2BD8-448F-474C-BD37-54043ABB7369}"/>
+          </ac:spMkLst>
+        </pc:spChg>
+        <pc:spChg chg="mod">
+          <ac:chgData name="Abel Valko" userId="10a3269d5dfe4f52" providerId="LiveId" clId="{60C8D2A3-1ADE-464A-84D8-267C02763CD5}" dt="2021-10-20T12:39:29.452" v="2029" actId="20577"/>
+          <ac:spMkLst>
+            <pc:docMk/>
+            <pc:sldMk cId="3637565257" sldId="345"/>
+            <ac:spMk id="3" creationId="{B8CCE1A7-598C-48E6-94D2-CC07FF1CB111}"/>
+          </ac:spMkLst>
+        </pc:spChg>
+        <pc:spChg chg="del">
+          <ac:chgData name="Abel Valko" userId="10a3269d5dfe4f52" providerId="LiveId" clId="{60C8D2A3-1ADE-464A-84D8-267C02763CD5}" dt="2021-10-20T09:12:20.108" v="1003" actId="478"/>
+          <ac:spMkLst>
+            <pc:docMk/>
+            <pc:sldMk cId="3637565257" sldId="345"/>
+            <ac:spMk id="7" creationId="{5BACF8C1-52AA-4B42-BBEC-255FDA5683E4}"/>
+          </ac:spMkLst>
+        </pc:spChg>
+        <pc:spChg chg="del mod">
+          <ac:chgData name="Abel Valko" userId="10a3269d5dfe4f52" providerId="LiveId" clId="{60C8D2A3-1ADE-464A-84D8-267C02763CD5}" dt="2021-10-20T09:12:21.997" v="1005" actId="478"/>
+          <ac:spMkLst>
+            <pc:docMk/>
+            <pc:sldMk cId="3637565257" sldId="345"/>
+            <ac:spMk id="8" creationId="{F193D810-699A-44E6-88E8-8B1F908ECB32}"/>
+          </ac:spMkLst>
+        </pc:spChg>
+        <pc:picChg chg="del">
+          <ac:chgData name="Abel Valko" userId="10a3269d5dfe4f52" providerId="LiveId" clId="{60C8D2A3-1ADE-464A-84D8-267C02763CD5}" dt="2021-10-20T09:12:18.158" v="1002" actId="478"/>
+          <ac:picMkLst>
+            <pc:docMk/>
+            <pc:sldMk cId="3637565257" sldId="345"/>
+            <ac:picMk id="5" creationId="{57D0332D-7ADB-4644-AA35-CE718BB86767}"/>
+          </ac:picMkLst>
+        </pc:picChg>
+        <pc:picChg chg="del">
+          <ac:chgData name="Abel Valko" userId="10a3269d5dfe4f52" providerId="LiveId" clId="{60C8D2A3-1ADE-464A-84D8-267C02763CD5}" dt="2021-10-20T09:12:18.158" v="1002" actId="478"/>
+          <ac:picMkLst>
+            <pc:docMk/>
+            <pc:sldMk cId="3637565257" sldId="345"/>
+            <ac:picMk id="6" creationId="{069B3143-61CB-477C-8B57-0B4A8D4EC21A}"/>
+          </ac:picMkLst>
+        </pc:picChg>
+        <pc:picChg chg="add del mod">
+          <ac:chgData name="Abel Valko" userId="10a3269d5dfe4f52" providerId="LiveId" clId="{60C8D2A3-1ADE-464A-84D8-267C02763CD5}" dt="2021-10-20T09:28:07.467" v="1838" actId="21"/>
+          <ac:picMkLst>
+            <pc:docMk/>
+            <pc:sldMk cId="3637565257" sldId="345"/>
+            <ac:picMk id="9" creationId="{A33DFB7F-499F-489E-8F40-E24B65CA333F}"/>
+          </ac:picMkLst>
+        </pc:picChg>
+        <pc:picChg chg="add mod modCrop">
+          <ac:chgData name="Abel Valko" userId="10a3269d5dfe4f52" providerId="LiveId" clId="{60C8D2A3-1ADE-464A-84D8-267C02763CD5}" dt="2021-10-20T12:36:16.408" v="1964" actId="732"/>
+          <ac:picMkLst>
+            <pc:docMk/>
+            <pc:sldMk cId="3637565257" sldId="345"/>
+            <ac:picMk id="10" creationId="{4BC1B2D4-F491-49B7-8A1C-D674495DBEDD}"/>
+          </ac:picMkLst>
+        </pc:picChg>
+        <pc:picChg chg="add mod ord">
+          <ac:chgData name="Abel Valko" userId="10a3269d5dfe4f52" providerId="LiveId" clId="{60C8D2A3-1ADE-464A-84D8-267C02763CD5}" dt="2021-10-20T12:36:07.985" v="1962" actId="1076"/>
+          <ac:picMkLst>
+            <pc:docMk/>
+            <pc:sldMk cId="3637565257" sldId="345"/>
+            <ac:picMk id="11" creationId="{B93B8BD8-EE7C-44F2-B5EE-5FA16F7BAF46}"/>
+          </ac:picMkLst>
+        </pc:picChg>
+      </pc:sldChg>
+      <pc:sldChg chg="add del delCm">
+        <pc:chgData name="Abel Valko" userId="10a3269d5dfe4f52" providerId="LiveId" clId="{60C8D2A3-1ADE-464A-84D8-267C02763CD5}" dt="2021-10-20T09:15:31.156" v="1169" actId="47"/>
+        <pc:sldMkLst>
+          <pc:docMk/>
+          <pc:sldMk cId="3697252931" sldId="346"/>
         </pc:sldMkLst>
       </pc:sldChg>
       <pc:sldChg chg="del">
@@ -460,12 +649,204 @@
           <pc:sldMk cId="4009153543" sldId="346"/>
         </pc:sldMkLst>
       </pc:sldChg>
+      <pc:sldChg chg="modSp add mod">
+        <pc:chgData name="Abel Valko" userId="10a3269d5dfe4f52" providerId="LiveId" clId="{60C8D2A3-1ADE-464A-84D8-267C02763CD5}" dt="2021-10-20T12:40:14.365" v="2041" actId="20577"/>
+        <pc:sldMkLst>
+          <pc:docMk/>
+          <pc:sldMk cId="739374447" sldId="347"/>
+        </pc:sldMkLst>
+        <pc:spChg chg="mod">
+          <ac:chgData name="Abel Valko" userId="10a3269d5dfe4f52" providerId="LiveId" clId="{60C8D2A3-1ADE-464A-84D8-267C02763CD5}" dt="2021-10-20T09:15:34.190" v="1174" actId="20577"/>
+          <ac:spMkLst>
+            <pc:docMk/>
+            <pc:sldMk cId="739374447" sldId="347"/>
+            <ac:spMk id="2" creationId="{13DA2BD8-448F-474C-BD37-54043ABB7369}"/>
+          </ac:spMkLst>
+        </pc:spChg>
+        <pc:spChg chg="mod">
+          <ac:chgData name="Abel Valko" userId="10a3269d5dfe4f52" providerId="LiveId" clId="{60C8D2A3-1ADE-464A-84D8-267C02763CD5}" dt="2021-10-20T12:40:14.365" v="2041" actId="20577"/>
+          <ac:spMkLst>
+            <pc:docMk/>
+            <pc:sldMk cId="739374447" sldId="347"/>
+            <ac:spMk id="3" creationId="{B8CCE1A7-598C-48E6-94D2-CC07FF1CB111}"/>
+          </ac:spMkLst>
+        </pc:spChg>
+      </pc:sldChg>
       <pc:sldChg chg="del">
         <pc:chgData name="Abel Valko" userId="10a3269d5dfe4f52" providerId="LiveId" clId="{60C8D2A3-1ADE-464A-84D8-267C02763CD5}" dt="2021-10-17T12:49:59.092" v="1" actId="47"/>
         <pc:sldMkLst>
           <pc:docMk/>
           <pc:sldMk cId="2079473874" sldId="347"/>
         </pc:sldMkLst>
+      </pc:sldChg>
+      <pc:sldChg chg="modSp add del mod">
+        <pc:chgData name="Abel Valko" userId="10a3269d5dfe4f52" providerId="LiveId" clId="{60C8D2A3-1ADE-464A-84D8-267C02763CD5}" dt="2021-10-20T12:37:58.583" v="2000" actId="47"/>
+        <pc:sldMkLst>
+          <pc:docMk/>
+          <pc:sldMk cId="1133741260" sldId="348"/>
+        </pc:sldMkLst>
+        <pc:spChg chg="mod">
+          <ac:chgData name="Abel Valko" userId="10a3269d5dfe4f52" providerId="LiveId" clId="{60C8D2A3-1ADE-464A-84D8-267C02763CD5}" dt="2021-10-20T09:15:40.017" v="1182" actId="20577"/>
+          <ac:spMkLst>
+            <pc:docMk/>
+            <pc:sldMk cId="1133741260" sldId="348"/>
+            <ac:spMk id="2" creationId="{13DA2BD8-448F-474C-BD37-54043ABB7369}"/>
+          </ac:spMkLst>
+        </pc:spChg>
+      </pc:sldChg>
+      <pc:sldChg chg="modSp add mod">
+        <pc:chgData name="Abel Valko" userId="10a3269d5dfe4f52" providerId="LiveId" clId="{60C8D2A3-1ADE-464A-84D8-267C02763CD5}" dt="2021-10-20T09:20:36.051" v="1416" actId="20577"/>
+        <pc:sldMkLst>
+          <pc:docMk/>
+          <pc:sldMk cId="2263994922" sldId="349"/>
+        </pc:sldMkLst>
+        <pc:spChg chg="mod">
+          <ac:chgData name="Abel Valko" userId="10a3269d5dfe4f52" providerId="LiveId" clId="{60C8D2A3-1ADE-464A-84D8-267C02763CD5}" dt="2021-10-20T09:19:01.316" v="1228" actId="20577"/>
+          <ac:spMkLst>
+            <pc:docMk/>
+            <pc:sldMk cId="2263994922" sldId="349"/>
+            <ac:spMk id="2" creationId="{13DA2BD8-448F-474C-BD37-54043ABB7369}"/>
+          </ac:spMkLst>
+        </pc:spChg>
+        <pc:spChg chg="mod">
+          <ac:chgData name="Abel Valko" userId="10a3269d5dfe4f52" providerId="LiveId" clId="{60C8D2A3-1ADE-464A-84D8-267C02763CD5}" dt="2021-10-20T09:20:36.051" v="1416" actId="20577"/>
+          <ac:spMkLst>
+            <pc:docMk/>
+            <pc:sldMk cId="2263994922" sldId="349"/>
+            <ac:spMk id="3" creationId="{B8CCE1A7-598C-48E6-94D2-CC07FF1CB111}"/>
+          </ac:spMkLst>
+        </pc:spChg>
+      </pc:sldChg>
+      <pc:sldChg chg="modSp add mod">
+        <pc:chgData name="Abel Valko" userId="10a3269d5dfe4f52" providerId="LiveId" clId="{60C8D2A3-1ADE-464A-84D8-267C02763CD5}" dt="2021-10-20T09:22:16.920" v="1659" actId="20577"/>
+        <pc:sldMkLst>
+          <pc:docMk/>
+          <pc:sldMk cId="367106506" sldId="350"/>
+        </pc:sldMkLst>
+        <pc:spChg chg="mod">
+          <ac:chgData name="Abel Valko" userId="10a3269d5dfe4f52" providerId="LiveId" clId="{60C8D2A3-1ADE-464A-84D8-267C02763CD5}" dt="2021-10-20T09:20:44.107" v="1435" actId="20577"/>
+          <ac:spMkLst>
+            <pc:docMk/>
+            <pc:sldMk cId="367106506" sldId="350"/>
+            <ac:spMk id="2" creationId="{13DA2BD8-448F-474C-BD37-54043ABB7369}"/>
+          </ac:spMkLst>
+        </pc:spChg>
+        <pc:spChg chg="mod">
+          <ac:chgData name="Abel Valko" userId="10a3269d5dfe4f52" providerId="LiveId" clId="{60C8D2A3-1ADE-464A-84D8-267C02763CD5}" dt="2021-10-20T09:22:16.920" v="1659" actId="20577"/>
+          <ac:spMkLst>
+            <pc:docMk/>
+            <pc:sldMk cId="367106506" sldId="350"/>
+            <ac:spMk id="3" creationId="{B8CCE1A7-598C-48E6-94D2-CC07FF1CB111}"/>
+          </ac:spMkLst>
+        </pc:spChg>
+      </pc:sldChg>
+      <pc:sldChg chg="modSp add mod">
+        <pc:chgData name="Abel Valko" userId="10a3269d5dfe4f52" providerId="LiveId" clId="{60C8D2A3-1ADE-464A-84D8-267C02763CD5}" dt="2021-10-20T12:41:10.891" v="2129" actId="20577"/>
+        <pc:sldMkLst>
+          <pc:docMk/>
+          <pc:sldMk cId="3489264470" sldId="351"/>
+        </pc:sldMkLst>
+        <pc:spChg chg="mod">
+          <ac:chgData name="Abel Valko" userId="10a3269d5dfe4f52" providerId="LiveId" clId="{60C8D2A3-1ADE-464A-84D8-267C02763CD5}" dt="2021-10-20T09:22:41.867" v="1676" actId="20577"/>
+          <ac:spMkLst>
+            <pc:docMk/>
+            <pc:sldMk cId="3489264470" sldId="351"/>
+            <ac:spMk id="2" creationId="{13DA2BD8-448F-474C-BD37-54043ABB7369}"/>
+          </ac:spMkLst>
+        </pc:spChg>
+        <pc:spChg chg="mod">
+          <ac:chgData name="Abel Valko" userId="10a3269d5dfe4f52" providerId="LiveId" clId="{60C8D2A3-1ADE-464A-84D8-267C02763CD5}" dt="2021-10-20T12:41:10.891" v="2129" actId="20577"/>
+          <ac:spMkLst>
+            <pc:docMk/>
+            <pc:sldMk cId="3489264470" sldId="351"/>
+            <ac:spMk id="3" creationId="{B8CCE1A7-598C-48E6-94D2-CC07FF1CB111}"/>
+          </ac:spMkLst>
+        </pc:spChg>
+      </pc:sldChg>
+      <pc:sldChg chg="addSp modSp add mod">
+        <pc:chgData name="Abel Valko" userId="10a3269d5dfe4f52" providerId="LiveId" clId="{60C8D2A3-1ADE-464A-84D8-267C02763CD5}" dt="2021-10-20T09:42:38.170" v="1951" actId="20577"/>
+        <pc:sldMkLst>
+          <pc:docMk/>
+          <pc:sldMk cId="1510712571" sldId="352"/>
+        </pc:sldMkLst>
+        <pc:spChg chg="mod">
+          <ac:chgData name="Abel Valko" userId="10a3269d5dfe4f52" providerId="LiveId" clId="{60C8D2A3-1ADE-464A-84D8-267C02763CD5}" dt="2021-10-20T09:29:19.911" v="1854" actId="20577"/>
+          <ac:spMkLst>
+            <pc:docMk/>
+            <pc:sldMk cId="1510712571" sldId="352"/>
+            <ac:spMk id="2" creationId="{13DA2BD8-448F-474C-BD37-54043ABB7369}"/>
+          </ac:spMkLst>
+        </pc:spChg>
+        <pc:spChg chg="mod">
+          <ac:chgData name="Abel Valko" userId="10a3269d5dfe4f52" providerId="LiveId" clId="{60C8D2A3-1ADE-464A-84D8-267C02763CD5}" dt="2021-10-20T09:42:38.170" v="1951" actId="20577"/>
+          <ac:spMkLst>
+            <pc:docMk/>
+            <pc:sldMk cId="1510712571" sldId="352"/>
+            <ac:spMk id="3" creationId="{B8CCE1A7-598C-48E6-94D2-CC07FF1CB111}"/>
+          </ac:spMkLst>
+        </pc:spChg>
+        <pc:picChg chg="add mod modCrop">
+          <ac:chgData name="Abel Valko" userId="10a3269d5dfe4f52" providerId="LiveId" clId="{60C8D2A3-1ADE-464A-84D8-267C02763CD5}" dt="2021-10-20T09:39:02.752" v="1946" actId="1076"/>
+          <ac:picMkLst>
+            <pc:docMk/>
+            <pc:sldMk cId="1510712571" sldId="352"/>
+            <ac:picMk id="5" creationId="{09AD962D-0F94-478C-9D1F-B00891A1D91A}"/>
+          </ac:picMkLst>
+        </pc:picChg>
+        <pc:picChg chg="add mod">
+          <ac:chgData name="Abel Valko" userId="10a3269d5dfe4f52" providerId="LiveId" clId="{60C8D2A3-1ADE-464A-84D8-267C02763CD5}" dt="2021-10-20T09:38:55.959" v="1943" actId="1076"/>
+          <ac:picMkLst>
+            <pc:docMk/>
+            <pc:sldMk cId="1510712571" sldId="352"/>
+            <ac:picMk id="7" creationId="{D5317F2F-1B77-4B38-AC84-08CC347F1879}"/>
+          </ac:picMkLst>
+        </pc:picChg>
+      </pc:sldChg>
+      <pc:sldChg chg="modSp new mod">
+        <pc:chgData name="Abel Valko" userId="10a3269d5dfe4f52" providerId="LiveId" clId="{60C8D2A3-1ADE-464A-84D8-267C02763CD5}" dt="2021-10-20T12:43:11.989" v="2252" actId="20577"/>
+        <pc:sldMkLst>
+          <pc:docMk/>
+          <pc:sldMk cId="946999457" sldId="353"/>
+        </pc:sldMkLst>
+        <pc:spChg chg="mod">
+          <ac:chgData name="Abel Valko" userId="10a3269d5dfe4f52" providerId="LiveId" clId="{60C8D2A3-1ADE-464A-84D8-267C02763CD5}" dt="2021-10-20T12:41:38.573" v="2146" actId="20577"/>
+          <ac:spMkLst>
+            <pc:docMk/>
+            <pc:sldMk cId="946999457" sldId="353"/>
+            <ac:spMk id="2" creationId="{EB6CF070-03FB-41DB-B9E3-6E488723CC85}"/>
+          </ac:spMkLst>
+        </pc:spChg>
+        <pc:spChg chg="mod">
+          <ac:chgData name="Abel Valko" userId="10a3269d5dfe4f52" providerId="LiveId" clId="{60C8D2A3-1ADE-464A-84D8-267C02763CD5}" dt="2021-10-20T12:43:11.989" v="2252" actId="20577"/>
+          <ac:spMkLst>
+            <pc:docMk/>
+            <pc:sldMk cId="946999457" sldId="353"/>
+            <ac:spMk id="3" creationId="{4CC704AE-A201-4418-BF66-32270F1CB2E7}"/>
+          </ac:spMkLst>
+        </pc:spChg>
+      </pc:sldChg>
+      <pc:sldChg chg="modSp new mod">
+        <pc:chgData name="Abel Valko" userId="10a3269d5dfe4f52" providerId="LiveId" clId="{60C8D2A3-1ADE-464A-84D8-267C02763CD5}" dt="2021-10-20T12:45:40.839" v="2497" actId="20577"/>
+        <pc:sldMkLst>
+          <pc:docMk/>
+          <pc:sldMk cId="2910473792" sldId="354"/>
+        </pc:sldMkLst>
+        <pc:spChg chg="mod">
+          <ac:chgData name="Abel Valko" userId="10a3269d5dfe4f52" providerId="LiveId" clId="{60C8D2A3-1ADE-464A-84D8-267C02763CD5}" dt="2021-10-20T12:43:29.113" v="2264" actId="20577"/>
+          <ac:spMkLst>
+            <pc:docMk/>
+            <pc:sldMk cId="2910473792" sldId="354"/>
+            <ac:spMk id="2" creationId="{8F7F1732-F4D9-4FD5-A52B-9533169C77CC}"/>
+          </ac:spMkLst>
+        </pc:spChg>
+        <pc:spChg chg="mod">
+          <ac:chgData name="Abel Valko" userId="10a3269d5dfe4f52" providerId="LiveId" clId="{60C8D2A3-1ADE-464A-84D8-267C02763CD5}" dt="2021-10-20T12:45:40.839" v="2497" actId="20577"/>
+          <ac:spMkLst>
+            <pc:docMk/>
+            <pc:sldMk cId="2910473792" sldId="354"/>
+            <ac:spMk id="3" creationId="{356DFB3D-8EC0-4433-8670-498F7AE26EF9}"/>
+          </ac:spMkLst>
+        </pc:spChg>
       </pc:sldChg>
       <pc:sldMasterChg chg="delSldLayout">
         <pc:chgData name="Abel Valko" userId="10a3269d5dfe4f52" providerId="LiveId" clId="{60C8D2A3-1ADE-464A-84D8-267C02763CD5}" dt="2021-10-17T12:50:00.971" v="6" actId="47"/>
@@ -603,7 +984,7 @@
           <a:p>
             <a:fld id="{BB37BDEB-D08A-4BCC-82C3-65677B6346BB}" type="datetimeFigureOut">
               <a:rPr lang="en-US" smtClean="0"/>
-              <a:t>10/18/2021</a:t>
+              <a:t>10/20/2021</a:t>
             </a:fld>
             <a:endParaRPr lang="en-US"/>
           </a:p>
@@ -780,7 +1161,7 @@
           <a:p>
             <a:fld id="{D64182BB-4E27-4552-8EE4-33C8EF731305}" type="datetimeFigureOut">
               <a:rPr lang="en-US" smtClean="0"/>
-              <a:t>10/18/2021</a:t>
+              <a:t>10/20/2021</a:t>
             </a:fld>
             <a:endParaRPr lang="en-US"/>
           </a:p>
@@ -1285,7 +1666,7 @@
           <a:p>
             <a:fld id="{ED291B17-9318-49DB-B28B-6E5994AE9581}" type="datetime1">
               <a:rPr lang="en-US" smtClean="0"/>
-              <a:t>10/18/2021</a:t>
+              <a:t>10/20/2021</a:t>
             </a:fld>
             <a:endParaRPr lang="en-US" dirty="0"/>
           </a:p>
@@ -1444,7 +1825,7 @@
           <a:p>
             <a:fld id="{4EDE50D6-574B-40AF-946F-D52A04ADE379}" type="datetime1">
               <a:rPr lang="en-US" smtClean="0"/>
-              <a:t>10/18/2021</a:t>
+              <a:t>10/20/2021</a:t>
             </a:fld>
             <a:endParaRPr lang="en-US" dirty="0"/>
           </a:p>
@@ -1856,7 +2237,7 @@
           <a:p>
             <a:fld id="{4EDE50D6-574B-40AF-946F-D52A04ADE379}" type="datetime1">
               <a:rPr lang="en-US" smtClean="0"/>
-              <a:t>10/18/2021</a:t>
+              <a:t>10/20/2021</a:t>
             </a:fld>
             <a:endParaRPr lang="en-US" dirty="0"/>
           </a:p>
@@ -2332,7 +2713,7 @@
           <a:p>
             <a:fld id="{4EDE50D6-574B-40AF-946F-D52A04ADE379}" type="datetime1">
               <a:rPr lang="en-US" smtClean="0"/>
-              <a:t>10/18/2021</a:t>
+              <a:t>10/20/2021</a:t>
             </a:fld>
             <a:endParaRPr lang="en-US" dirty="0"/>
           </a:p>
@@ -2781,7 +3162,7 @@
           <a:p>
             <a:fld id="{4EDE50D6-574B-40AF-946F-D52A04ADE379}" type="datetime1">
               <a:rPr lang="en-US" smtClean="0"/>
-              <a:t>10/18/2021</a:t>
+              <a:t>10/20/2021</a:t>
             </a:fld>
             <a:endParaRPr lang="en-US" dirty="0"/>
           </a:p>
@@ -3013,7 +3394,7 @@
           <a:p>
             <a:fld id="{4EDE50D6-574B-40AF-946F-D52A04ADE379}" type="datetime1">
               <a:rPr lang="en-US" noProof="0" smtClean="0"/>
-              <a:t>10/18/2021</a:t>
+              <a:t>10/20/2021</a:t>
             </a:fld>
             <a:endParaRPr lang="en-US" noProof="0"/>
           </a:p>
@@ -3711,7 +4092,7 @@
           <a:p>
             <a:fld id="{4EDE50D6-574B-40AF-946F-D52A04ADE379}" type="datetime1">
               <a:rPr lang="en-US" noProof="0" smtClean="0"/>
-              <a:t>10/18/2021</a:t>
+              <a:t>10/20/2021</a:t>
             </a:fld>
             <a:endParaRPr lang="en-US" noProof="0"/>
           </a:p>
@@ -4068,7 +4449,7 @@
           <a:p>
             <a:fld id="{4EDE50D6-574B-40AF-946F-D52A04ADE379}" type="datetime1">
               <a:rPr lang="en-US" noProof="0" smtClean="0"/>
-              <a:t>10/18/2021</a:t>
+              <a:t>10/20/2021</a:t>
             </a:fld>
             <a:endParaRPr lang="en-US" noProof="0"/>
           </a:p>
@@ -4630,7 +5011,7 @@
           <a:p>
             <a:fld id="{78DD82B9-B8EE-4375-B6FF-88FA6ABB15D9}" type="datetime1">
               <a:rPr lang="en-US" smtClean="0"/>
-              <a:t>10/18/2021</a:t>
+              <a:t>10/20/2021</a:t>
             </a:fld>
             <a:endParaRPr lang="en-US" dirty="0"/>
           </a:p>
@@ -4978,7 +5359,7 @@
           <a:p>
             <a:fld id="{78DD82B9-B8EE-4375-B6FF-88FA6ABB15D9}" type="datetime1">
               <a:rPr lang="en-US" smtClean="0"/>
-              <a:t>10/18/2021</a:t>
+              <a:t>10/20/2021</a:t>
             </a:fld>
             <a:endParaRPr lang="en-US" dirty="0"/>
           </a:p>
@@ -5381,7 +5762,7 @@
           <a:p>
             <a:fld id="{B2497495-0637-405E-AE64-5CC7506D51F5}" type="datetime1">
               <a:rPr lang="en-US" smtClean="0"/>
-              <a:t>10/18/2021</a:t>
+              <a:t>10/20/2021</a:t>
             </a:fld>
             <a:endParaRPr lang="en-US" dirty="0"/>
           </a:p>
@@ -5674,7 +6055,7 @@
           <a:p>
             <a:fld id="{7BFFD690-9426-415D-8B65-26881E07B2D4}" type="datetime1">
               <a:rPr lang="en-US" smtClean="0"/>
-              <a:t>10/18/2021</a:t>
+              <a:t>10/20/2021</a:t>
             </a:fld>
             <a:endParaRPr lang="en-US" dirty="0"/>
           </a:p>
@@ -6168,7 +6549,7 @@
           <a:p>
             <a:fld id="{04C4989A-474C-40DE-95B9-011C28B71673}" type="datetime1">
               <a:rPr lang="en-US" smtClean="0"/>
-              <a:t>10/18/2021</a:t>
+              <a:t>10/20/2021</a:t>
             </a:fld>
             <a:endParaRPr lang="en-US" dirty="0"/>
           </a:p>
@@ -6472,7 +6853,7 @@
           <a:p>
             <a:fld id="{5DB4ED54-5B5E-4A04-93D3-5772E3CE3818}" type="datetime1">
               <a:rPr lang="en-US" smtClean="0"/>
-              <a:t>10/18/2021</a:t>
+              <a:t>10/20/2021</a:t>
             </a:fld>
             <a:endParaRPr lang="en-US" dirty="0"/>
           </a:p>
@@ -6659,7 +7040,7 @@
           <a:p>
             <a:fld id="{4EDE50D6-574B-40AF-946F-D52A04ADE379}" type="datetime1">
               <a:rPr lang="en-US" smtClean="0"/>
-              <a:t>10/18/2021</a:t>
+              <a:t>10/20/2021</a:t>
             </a:fld>
             <a:endParaRPr lang="en-US" dirty="0"/>
           </a:p>
@@ -6871,7 +7252,7 @@
           <a:p>
             <a:fld id="{4EDE50D6-574B-40AF-946F-D52A04ADE379}" type="datetime1">
               <a:rPr lang="en-US" smtClean="0"/>
-              <a:t>10/18/2021</a:t>
+              <a:t>10/20/2021</a:t>
             </a:fld>
             <a:endParaRPr lang="en-US" dirty="0"/>
           </a:p>
@@ -7303,7 +7684,7 @@
           <a:p>
             <a:fld id="{ED291B17-9318-49DB-B28B-6E5994AE9581}" type="datetime1">
               <a:rPr lang="en-US" smtClean="0"/>
-              <a:t>10/18/2021</a:t>
+              <a:t>10/20/2021</a:t>
             </a:fld>
             <a:endParaRPr lang="en-US" dirty="0"/>
           </a:p>
@@ -7927,6 +8308,393 @@
 </p:sld>
 </file>
 
+<file path=ppt/slides/slide10.xml><?xml version="1.0" encoding="utf-8"?>
+<p:sld xmlns:a="http://schemas.openxmlformats.org/drawingml/2006/main" xmlns:r="http://schemas.openxmlformats.org/officeDocument/2006/relationships" xmlns:p="http://schemas.openxmlformats.org/presentationml/2006/main">
+  <p:cSld>
+    <p:spTree>
+      <p:nvGrpSpPr>
+        <p:cNvPr id="1" name=""/>
+        <p:cNvGrpSpPr/>
+        <p:nvPr/>
+      </p:nvGrpSpPr>
+      <p:grpSpPr>
+        <a:xfrm>
+          <a:off x="0" y="0"/>
+          <a:ext cx="0" cy="0"/>
+          <a:chOff x="0" y="0"/>
+          <a:chExt cx="0" cy="0"/>
+        </a:xfrm>
+      </p:grpSpPr>
+      <p:sp>
+        <p:nvSpPr>
+          <p:cNvPr id="2" name="Title 1">
+            <a:extLst>
+              <a:ext uri="{FF2B5EF4-FFF2-40B4-BE49-F238E27FC236}">
+                <a16:creationId xmlns:a16="http://schemas.microsoft.com/office/drawing/2014/main" id="{13DA2BD8-448F-474C-BD37-54043ABB7369}"/>
+              </a:ext>
+            </a:extLst>
+          </p:cNvPr>
+          <p:cNvSpPr>
+            <a:spLocks noGrp="1"/>
+          </p:cNvSpPr>
+          <p:nvPr>
+            <p:ph type="title"/>
+          </p:nvPr>
+        </p:nvSpPr>
+        <p:spPr/>
+        <p:txBody>
+          <a:bodyPr/>
+          <a:lstStyle/>
+          <a:p>
+            <a:r>
+              <a:rPr lang="en-GB" dirty="0"/>
+              <a:t>Irrelevant Input</a:t>
+            </a:r>
+          </a:p>
+        </p:txBody>
+      </p:sp>
+      <p:sp>
+        <p:nvSpPr>
+          <p:cNvPr id="3" name="Content Placeholder 2">
+            <a:extLst>
+              <a:ext uri="{FF2B5EF4-FFF2-40B4-BE49-F238E27FC236}">
+                <a16:creationId xmlns:a16="http://schemas.microsoft.com/office/drawing/2014/main" id="{B8CCE1A7-598C-48E6-94D2-CC07FF1CB111}"/>
+              </a:ext>
+            </a:extLst>
+          </p:cNvPr>
+          <p:cNvSpPr>
+            <a:spLocks noGrp="1"/>
+          </p:cNvSpPr>
+          <p:nvPr>
+            <p:ph idx="1"/>
+          </p:nvPr>
+        </p:nvSpPr>
+        <p:spPr>
+          <a:xfrm>
+            <a:off x="581192" y="2338063"/>
+            <a:ext cx="6296685" cy="3210352"/>
+          </a:xfrm>
+        </p:spPr>
+        <p:txBody>
+          <a:bodyPr>
+            <a:normAutofit/>
+          </a:bodyPr>
+          <a:lstStyle/>
+          <a:p>
+            <a:r>
+              <a:rPr lang="en-GB" dirty="0"/>
+              <a:t>Decision Tree pruning gets rid of irrelevant features, therefore it is an ideal method</a:t>
+            </a:r>
+          </a:p>
+          <a:p>
+            <a:r>
+              <a:rPr lang="en-GB" dirty="0"/>
+              <a:t>Boosting affects all features, since it is done on the datapoint.</a:t>
+            </a:r>
+          </a:p>
+        </p:txBody>
+      </p:sp>
+    </p:spTree>
+    <p:extLst>
+      <p:ext uri="{BB962C8B-B14F-4D97-AF65-F5344CB8AC3E}">
+        <p14:creationId xmlns:p14="http://schemas.microsoft.com/office/powerpoint/2010/main" val="367106506"/>
+      </p:ext>
+    </p:extLst>
+  </p:cSld>
+  <p:clrMapOvr>
+    <a:masterClrMapping/>
+  </p:clrMapOvr>
+</p:sld>
+</file>
+
+<file path=ppt/slides/slide11.xml><?xml version="1.0" encoding="utf-8"?>
+<p:sld xmlns:a="http://schemas.openxmlformats.org/drawingml/2006/main" xmlns:r="http://schemas.openxmlformats.org/officeDocument/2006/relationships" xmlns:p="http://schemas.openxmlformats.org/presentationml/2006/main">
+  <p:cSld>
+    <p:spTree>
+      <p:nvGrpSpPr>
+        <p:cNvPr id="1" name=""/>
+        <p:cNvGrpSpPr/>
+        <p:nvPr/>
+      </p:nvGrpSpPr>
+      <p:grpSpPr>
+        <a:xfrm>
+          <a:off x="0" y="0"/>
+          <a:ext cx="0" cy="0"/>
+          <a:chOff x="0" y="0"/>
+          <a:chExt cx="0" cy="0"/>
+        </a:xfrm>
+      </p:grpSpPr>
+      <p:sp>
+        <p:nvSpPr>
+          <p:cNvPr id="2" name="Title 1">
+            <a:extLst>
+              <a:ext uri="{FF2B5EF4-FFF2-40B4-BE49-F238E27FC236}">
+                <a16:creationId xmlns:a16="http://schemas.microsoft.com/office/drawing/2014/main" id="{13DA2BD8-448F-474C-BD37-54043ABB7369}"/>
+              </a:ext>
+            </a:extLst>
+          </p:cNvPr>
+          <p:cNvSpPr>
+            <a:spLocks noGrp="1"/>
+          </p:cNvSpPr>
+          <p:nvPr>
+            <p:ph type="title"/>
+          </p:nvPr>
+        </p:nvSpPr>
+        <p:spPr/>
+        <p:txBody>
+          <a:bodyPr/>
+          <a:lstStyle/>
+          <a:p>
+            <a:r>
+              <a:rPr lang="en-GB" dirty="0"/>
+              <a:t>Predictive Power</a:t>
+            </a:r>
+          </a:p>
+        </p:txBody>
+      </p:sp>
+      <p:sp>
+        <p:nvSpPr>
+          <p:cNvPr id="3" name="Content Placeholder 2">
+            <a:extLst>
+              <a:ext uri="{FF2B5EF4-FFF2-40B4-BE49-F238E27FC236}">
+                <a16:creationId xmlns:a16="http://schemas.microsoft.com/office/drawing/2014/main" id="{B8CCE1A7-598C-48E6-94D2-CC07FF1CB111}"/>
+              </a:ext>
+            </a:extLst>
+          </p:cNvPr>
+          <p:cNvSpPr>
+            <a:spLocks noGrp="1"/>
+          </p:cNvSpPr>
+          <p:nvPr>
+            <p:ph idx="1"/>
+          </p:nvPr>
+        </p:nvSpPr>
+        <p:spPr>
+          <a:xfrm>
+            <a:off x="581192" y="2338063"/>
+            <a:ext cx="6296685" cy="3210352"/>
+          </a:xfrm>
+        </p:spPr>
+        <p:txBody>
+          <a:bodyPr>
+            <a:normAutofit/>
+          </a:bodyPr>
+          <a:lstStyle/>
+          <a:p>
+            <a:r>
+              <a:rPr lang="en-GB" dirty="0"/>
+              <a:t>Boosted  methods seem to work better generally</a:t>
+            </a:r>
+          </a:p>
+          <a:p>
+            <a:r>
+              <a:rPr lang="en-GB" dirty="0"/>
+              <a:t>Data dependent which method is preferred, Naïve Bayes may be ideal for independent feature spaces</a:t>
+            </a:r>
+          </a:p>
+        </p:txBody>
+      </p:sp>
+    </p:spTree>
+    <p:extLst>
+      <p:ext uri="{BB962C8B-B14F-4D97-AF65-F5344CB8AC3E}">
+        <p14:creationId xmlns:p14="http://schemas.microsoft.com/office/powerpoint/2010/main" val="3489264470"/>
+      </p:ext>
+    </p:extLst>
+  </p:cSld>
+  <p:clrMapOvr>
+    <a:masterClrMapping/>
+  </p:clrMapOvr>
+</p:sld>
+</file>
+
+<file path=ppt/slides/slide12.xml><?xml version="1.0" encoding="utf-8"?>
+<p:sld xmlns:a="http://schemas.openxmlformats.org/drawingml/2006/main" xmlns:r="http://schemas.openxmlformats.org/officeDocument/2006/relationships" xmlns:p="http://schemas.openxmlformats.org/presentationml/2006/main">
+  <p:cSld>
+    <p:spTree>
+      <p:nvGrpSpPr>
+        <p:cNvPr id="1" name=""/>
+        <p:cNvGrpSpPr/>
+        <p:nvPr/>
+      </p:nvGrpSpPr>
+      <p:grpSpPr>
+        <a:xfrm>
+          <a:off x="0" y="0"/>
+          <a:ext cx="0" cy="0"/>
+          <a:chOff x="0" y="0"/>
+          <a:chExt cx="0" cy="0"/>
+        </a:xfrm>
+      </p:grpSpPr>
+      <p:sp>
+        <p:nvSpPr>
+          <p:cNvPr id="2" name="Title 1">
+            <a:extLst>
+              <a:ext uri="{FF2B5EF4-FFF2-40B4-BE49-F238E27FC236}">
+                <a16:creationId xmlns:a16="http://schemas.microsoft.com/office/drawing/2014/main" id="{EB6CF070-03FB-41DB-B9E3-6E488723CC85}"/>
+              </a:ext>
+            </a:extLst>
+          </p:cNvPr>
+          <p:cNvSpPr>
+            <a:spLocks noGrp="1"/>
+          </p:cNvSpPr>
+          <p:nvPr>
+            <p:ph type="title"/>
+          </p:nvPr>
+        </p:nvSpPr>
+        <p:spPr/>
+        <p:txBody>
+          <a:bodyPr/>
+          <a:lstStyle/>
+          <a:p>
+            <a:r>
+              <a:rPr lang="en-GB" dirty="0"/>
+              <a:t>Mixed data types</a:t>
+            </a:r>
+          </a:p>
+        </p:txBody>
+      </p:sp>
+      <p:sp>
+        <p:nvSpPr>
+          <p:cNvPr id="3" name="Content Placeholder 2">
+            <a:extLst>
+              <a:ext uri="{FF2B5EF4-FFF2-40B4-BE49-F238E27FC236}">
+                <a16:creationId xmlns:a16="http://schemas.microsoft.com/office/drawing/2014/main" id="{4CC704AE-A201-4418-BF66-32270F1CB2E7}"/>
+              </a:ext>
+            </a:extLst>
+          </p:cNvPr>
+          <p:cNvSpPr>
+            <a:spLocks noGrp="1"/>
+          </p:cNvSpPr>
+          <p:nvPr>
+            <p:ph idx="1"/>
+          </p:nvPr>
+        </p:nvSpPr>
+        <p:spPr/>
+        <p:txBody>
+          <a:bodyPr/>
+          <a:lstStyle/>
+          <a:p>
+            <a:r>
+              <a:rPr lang="en-GB" dirty="0"/>
+              <a:t>Naïve Bayes is ideal for continuous data</a:t>
+            </a:r>
+          </a:p>
+          <a:p>
+            <a:r>
+              <a:rPr lang="en-GB" dirty="0"/>
+              <a:t>Both can be used for mixed data</a:t>
+            </a:r>
+          </a:p>
+        </p:txBody>
+      </p:sp>
+    </p:spTree>
+    <p:extLst>
+      <p:ext uri="{BB962C8B-B14F-4D97-AF65-F5344CB8AC3E}">
+        <p14:creationId xmlns:p14="http://schemas.microsoft.com/office/powerpoint/2010/main" val="946999457"/>
+      </p:ext>
+    </p:extLst>
+  </p:cSld>
+  <p:clrMapOvr>
+    <a:masterClrMapping/>
+  </p:clrMapOvr>
+</p:sld>
+</file>
+
+<file path=ppt/slides/slide13.xml><?xml version="1.0" encoding="utf-8"?>
+<p:sld xmlns:a="http://schemas.openxmlformats.org/drawingml/2006/main" xmlns:r="http://schemas.openxmlformats.org/officeDocument/2006/relationships" xmlns:p="http://schemas.openxmlformats.org/presentationml/2006/main">
+  <p:cSld>
+    <p:spTree>
+      <p:nvGrpSpPr>
+        <p:cNvPr id="1" name=""/>
+        <p:cNvGrpSpPr/>
+        <p:nvPr/>
+      </p:nvGrpSpPr>
+      <p:grpSpPr>
+        <a:xfrm>
+          <a:off x="0" y="0"/>
+          <a:ext cx="0" cy="0"/>
+          <a:chOff x="0" y="0"/>
+          <a:chExt cx="0" cy="0"/>
+        </a:xfrm>
+      </p:grpSpPr>
+      <p:sp>
+        <p:nvSpPr>
+          <p:cNvPr id="2" name="Title 1">
+            <a:extLst>
+              <a:ext uri="{FF2B5EF4-FFF2-40B4-BE49-F238E27FC236}">
+                <a16:creationId xmlns:a16="http://schemas.microsoft.com/office/drawing/2014/main" id="{8F7F1732-F4D9-4FD5-A52B-9533169C77CC}"/>
+              </a:ext>
+            </a:extLst>
+          </p:cNvPr>
+          <p:cNvSpPr>
+            <a:spLocks noGrp="1"/>
+          </p:cNvSpPr>
+          <p:nvPr>
+            <p:ph type="title"/>
+          </p:nvPr>
+        </p:nvSpPr>
+        <p:spPr/>
+        <p:txBody>
+          <a:bodyPr/>
+          <a:lstStyle/>
+          <a:p>
+            <a:r>
+              <a:rPr lang="en-GB" dirty="0"/>
+              <a:t>Scalability</a:t>
+            </a:r>
+          </a:p>
+        </p:txBody>
+      </p:sp>
+      <p:sp>
+        <p:nvSpPr>
+          <p:cNvPr id="3" name="Content Placeholder 2">
+            <a:extLst>
+              <a:ext uri="{FF2B5EF4-FFF2-40B4-BE49-F238E27FC236}">
+                <a16:creationId xmlns:a16="http://schemas.microsoft.com/office/drawing/2014/main" id="{356DFB3D-8EC0-4433-8670-498F7AE26EF9}"/>
+              </a:ext>
+            </a:extLst>
+          </p:cNvPr>
+          <p:cNvSpPr>
+            <a:spLocks noGrp="1"/>
+          </p:cNvSpPr>
+          <p:nvPr>
+            <p:ph idx="1"/>
+          </p:nvPr>
+        </p:nvSpPr>
+        <p:spPr/>
+        <p:txBody>
+          <a:bodyPr/>
+          <a:lstStyle/>
+          <a:p>
+            <a:r>
+              <a:rPr lang="en-GB" dirty="0"/>
+              <a:t>Naïve Bayes has high computational cost due to matrix inversion and computation</a:t>
+            </a:r>
+          </a:p>
+          <a:p>
+            <a:r>
+              <a:rPr lang="en-GB" dirty="0"/>
+              <a:t>Decision Trees are highly effective methods which scale well, but training also increases in complexity with large </a:t>
+            </a:r>
+            <a:r>
+              <a:rPr lang="en-GB" dirty="0" err="1"/>
+              <a:t>datsets</a:t>
+            </a:r>
+            <a:endParaRPr lang="en-GB" dirty="0"/>
+          </a:p>
+        </p:txBody>
+      </p:sp>
+    </p:spTree>
+    <p:extLst>
+      <p:ext uri="{BB962C8B-B14F-4D97-AF65-F5344CB8AC3E}">
+        <p14:creationId xmlns:p14="http://schemas.microsoft.com/office/powerpoint/2010/main" val="2910473792"/>
+      </p:ext>
+    </p:extLst>
+  </p:cSld>
+  <p:clrMapOvr>
+    <a:masterClrMapping/>
+  </p:clrMapOvr>
+</p:sld>
+</file>
+
 <file path=ppt/slides/slide2.xml><?xml version="1.0" encoding="utf-8"?>
 <p:sld xmlns:a="http://schemas.openxmlformats.org/drawingml/2006/main" xmlns:r="http://schemas.openxmlformats.org/officeDocument/2006/relationships" xmlns:p="http://schemas.openxmlformats.org/presentationml/2006/main">
   <p:cSld>
@@ -8183,6 +8951,12 @@
           <a:p>
             <a:r>
               <a:rPr lang="en-GB" dirty="0"/>
+              <a:t>SVM could be used for class 1 and 2</a:t>
+            </a:r>
+          </a:p>
+          <a:p>
+            <a:r>
+              <a:rPr lang="en-GB" dirty="0"/>
               <a:t>Decision tree does not seem better</a:t>
             </a:r>
           </a:p>
@@ -8347,6 +9121,908 @@
       <p188:commentRel xmlns:p188="http://schemas.microsoft.com/office/powerpoint/2018/8/main" r:id="rId2"/>
     </p:ext>
   </p:extLst>
+</p:sld>
+</file>
+
+<file path=ppt/slides/slide4.xml><?xml version="1.0" encoding="utf-8"?>
+<p:sld xmlns:a="http://schemas.openxmlformats.org/drawingml/2006/main" xmlns:r="http://schemas.openxmlformats.org/officeDocument/2006/relationships" xmlns:p="http://schemas.openxmlformats.org/presentationml/2006/main">
+  <p:cSld>
+    <p:spTree>
+      <p:nvGrpSpPr>
+        <p:cNvPr id="1" name=""/>
+        <p:cNvGrpSpPr/>
+        <p:nvPr/>
+      </p:nvGrpSpPr>
+      <p:grpSpPr>
+        <a:xfrm>
+          <a:off x="0" y="0"/>
+          <a:ext cx="0" cy="0"/>
+          <a:chOff x="0" y="0"/>
+          <a:chExt cx="0" cy="0"/>
+        </a:xfrm>
+      </p:grpSpPr>
+      <p:sp>
+        <p:nvSpPr>
+          <p:cNvPr id="2" name="Text Placeholder 1">
+            <a:extLst>
+              <a:ext uri="{FF2B5EF4-FFF2-40B4-BE49-F238E27FC236}">
+                <a16:creationId xmlns:a16="http://schemas.microsoft.com/office/drawing/2014/main" id="{B8BE6083-843E-4374-933A-2BE17CAADA82}"/>
+              </a:ext>
+            </a:extLst>
+          </p:cNvPr>
+          <p:cNvSpPr>
+            <a:spLocks noGrp="1"/>
+          </p:cNvSpPr>
+          <p:nvPr>
+            <p:ph type="body" idx="1"/>
+          </p:nvPr>
+        </p:nvSpPr>
+        <p:spPr/>
+        <p:txBody>
+          <a:bodyPr/>
+          <a:lstStyle/>
+          <a:p>
+            <a:r>
+              <a:rPr lang="en-GB" dirty="0"/>
+              <a:t>Without</a:t>
+            </a:r>
+          </a:p>
+        </p:txBody>
+      </p:sp>
+      <p:sp>
+        <p:nvSpPr>
+          <p:cNvPr id="3" name="Content Placeholder 2">
+            <a:extLst>
+              <a:ext uri="{FF2B5EF4-FFF2-40B4-BE49-F238E27FC236}">
+                <a16:creationId xmlns:a16="http://schemas.microsoft.com/office/drawing/2014/main" id="{66130370-2A0B-4DBB-8465-00D3F5B4096E}"/>
+              </a:ext>
+            </a:extLst>
+          </p:cNvPr>
+          <p:cNvSpPr>
+            <a:spLocks noGrp="1"/>
+          </p:cNvSpPr>
+          <p:nvPr>
+            <p:ph sz="half" idx="2"/>
+          </p:nvPr>
+        </p:nvSpPr>
+        <p:spPr/>
+        <p:txBody>
+          <a:bodyPr/>
+          <a:lstStyle/>
+          <a:p>
+            <a:r>
+              <a:rPr lang="en-GB" dirty="0"/>
+              <a:t>Accuracy: 89.5%</a:t>
+            </a:r>
+          </a:p>
+          <a:p>
+            <a:r>
+              <a:rPr lang="en-GB" dirty="0"/>
+              <a:t>Standard Deviation: 3.97</a:t>
+            </a:r>
+          </a:p>
+        </p:txBody>
+      </p:sp>
+      <p:sp>
+        <p:nvSpPr>
+          <p:cNvPr id="4" name="Text Placeholder 3">
+            <a:extLst>
+              <a:ext uri="{FF2B5EF4-FFF2-40B4-BE49-F238E27FC236}">
+                <a16:creationId xmlns:a16="http://schemas.microsoft.com/office/drawing/2014/main" id="{47D7A67B-9E93-47B6-BEC4-A2ADDD7E950C}"/>
+              </a:ext>
+            </a:extLst>
+          </p:cNvPr>
+          <p:cNvSpPr>
+            <a:spLocks noGrp="1"/>
+          </p:cNvSpPr>
+          <p:nvPr>
+            <p:ph type="body" sz="quarter" idx="3"/>
+          </p:nvPr>
+        </p:nvSpPr>
+        <p:spPr/>
+        <p:txBody>
+          <a:bodyPr/>
+          <a:lstStyle/>
+          <a:p>
+            <a:r>
+              <a:rPr lang="en-GB" dirty="0"/>
+              <a:t>With</a:t>
+            </a:r>
+          </a:p>
+        </p:txBody>
+      </p:sp>
+      <p:sp>
+        <p:nvSpPr>
+          <p:cNvPr id="5" name="Content Placeholder 4">
+            <a:extLst>
+              <a:ext uri="{FF2B5EF4-FFF2-40B4-BE49-F238E27FC236}">
+                <a16:creationId xmlns:a16="http://schemas.microsoft.com/office/drawing/2014/main" id="{3535F67E-C81D-4BC4-AB67-D415CE6FE6F7}"/>
+              </a:ext>
+            </a:extLst>
+          </p:cNvPr>
+          <p:cNvSpPr>
+            <a:spLocks noGrp="1"/>
+          </p:cNvSpPr>
+          <p:nvPr>
+            <p:ph sz="quarter" idx="4"/>
+          </p:nvPr>
+        </p:nvSpPr>
+        <p:spPr/>
+        <p:txBody>
+          <a:bodyPr/>
+          <a:lstStyle/>
+          <a:p>
+            <a:r>
+              <a:rPr lang="en-GB" dirty="0"/>
+              <a:t>Accuracy: 94.2%</a:t>
+            </a:r>
+          </a:p>
+          <a:p>
+            <a:r>
+              <a:rPr lang="en-GB" dirty="0"/>
+              <a:t>Standard Deviation: 3.76</a:t>
+            </a:r>
+          </a:p>
+        </p:txBody>
+      </p:sp>
+      <p:sp>
+        <p:nvSpPr>
+          <p:cNvPr id="6" name="Title 5">
+            <a:extLst>
+              <a:ext uri="{FF2B5EF4-FFF2-40B4-BE49-F238E27FC236}">
+                <a16:creationId xmlns:a16="http://schemas.microsoft.com/office/drawing/2014/main" id="{BFE883A1-329B-45CC-AC8E-7EE8784BFA2A}"/>
+              </a:ext>
+            </a:extLst>
+          </p:cNvPr>
+          <p:cNvSpPr>
+            <a:spLocks noGrp="1"/>
+          </p:cNvSpPr>
+          <p:nvPr>
+            <p:ph type="title"/>
+          </p:nvPr>
+        </p:nvSpPr>
+        <p:spPr/>
+        <p:txBody>
+          <a:bodyPr/>
+          <a:lstStyle/>
+          <a:p>
+            <a:r>
+              <a:rPr lang="en-GB" dirty="0"/>
+              <a:t>Iris - </a:t>
+            </a:r>
+            <a:r>
+              <a:rPr lang="en-GB" dirty="0" err="1"/>
+              <a:t>Adaboost</a:t>
+            </a:r>
+            <a:endParaRPr lang="en-GB" dirty="0"/>
+          </a:p>
+        </p:txBody>
+      </p:sp>
+    </p:spTree>
+    <p:extLst>
+      <p:ext uri="{BB962C8B-B14F-4D97-AF65-F5344CB8AC3E}">
+        <p14:creationId xmlns:p14="http://schemas.microsoft.com/office/powerpoint/2010/main" val="1455956935"/>
+      </p:ext>
+    </p:extLst>
+  </p:cSld>
+  <p:clrMapOvr>
+    <a:masterClrMapping/>
+  </p:clrMapOvr>
+</p:sld>
+</file>
+
+<file path=ppt/slides/slide5.xml><?xml version="1.0" encoding="utf-8"?>
+<p:sld xmlns:a="http://schemas.openxmlformats.org/drawingml/2006/main" xmlns:r="http://schemas.openxmlformats.org/officeDocument/2006/relationships" xmlns:p="http://schemas.openxmlformats.org/presentationml/2006/main">
+  <p:cSld>
+    <p:spTree>
+      <p:nvGrpSpPr>
+        <p:cNvPr id="1" name=""/>
+        <p:cNvGrpSpPr/>
+        <p:nvPr/>
+      </p:nvGrpSpPr>
+      <p:grpSpPr>
+        <a:xfrm>
+          <a:off x="0" y="0"/>
+          <a:ext cx="0" cy="0"/>
+          <a:chOff x="0" y="0"/>
+          <a:chExt cx="0" cy="0"/>
+        </a:xfrm>
+      </p:grpSpPr>
+      <p:sp>
+        <p:nvSpPr>
+          <p:cNvPr id="2" name="Title 1">
+            <a:extLst>
+              <a:ext uri="{FF2B5EF4-FFF2-40B4-BE49-F238E27FC236}">
+                <a16:creationId xmlns:a16="http://schemas.microsoft.com/office/drawing/2014/main" id="{13DA2BD8-448F-474C-BD37-54043ABB7369}"/>
+              </a:ext>
+            </a:extLst>
+          </p:cNvPr>
+          <p:cNvSpPr>
+            <a:spLocks noGrp="1"/>
+          </p:cNvSpPr>
+          <p:nvPr>
+            <p:ph type="title"/>
+          </p:nvPr>
+        </p:nvSpPr>
+        <p:spPr/>
+        <p:txBody>
+          <a:bodyPr/>
+          <a:lstStyle/>
+          <a:p>
+            <a:r>
+              <a:rPr lang="en-GB" dirty="0"/>
+              <a:t>Boosted iris</a:t>
+            </a:r>
+          </a:p>
+        </p:txBody>
+      </p:sp>
+      <p:sp>
+        <p:nvSpPr>
+          <p:cNvPr id="3" name="Content Placeholder 2">
+            <a:extLst>
+              <a:ext uri="{FF2B5EF4-FFF2-40B4-BE49-F238E27FC236}">
+                <a16:creationId xmlns:a16="http://schemas.microsoft.com/office/drawing/2014/main" id="{B8CCE1A7-598C-48E6-94D2-CC07FF1CB111}"/>
+              </a:ext>
+            </a:extLst>
+          </p:cNvPr>
+          <p:cNvSpPr>
+            <a:spLocks noGrp="1"/>
+          </p:cNvSpPr>
+          <p:nvPr>
+            <p:ph idx="1"/>
+          </p:nvPr>
+        </p:nvSpPr>
+        <p:spPr>
+          <a:xfrm>
+            <a:off x="581192" y="2006759"/>
+            <a:ext cx="4653417" cy="3210352"/>
+          </a:xfrm>
+        </p:spPr>
+        <p:txBody>
+          <a:bodyPr>
+            <a:normAutofit/>
+          </a:bodyPr>
+          <a:lstStyle/>
+          <a:p>
+            <a:r>
+              <a:rPr lang="en-GB" dirty="0"/>
+              <a:t>More complex boundary</a:t>
+            </a:r>
+          </a:p>
+          <a:p>
+            <a:r>
+              <a:rPr lang="en-GB" dirty="0"/>
+              <a:t>Large variance</a:t>
+            </a:r>
+          </a:p>
+          <a:p>
+            <a:r>
+              <a:rPr lang="en-GB" dirty="0"/>
+              <a:t>Risk for overfitting</a:t>
+            </a:r>
+          </a:p>
+        </p:txBody>
+      </p:sp>
+      <p:pic>
+        <p:nvPicPr>
+          <p:cNvPr id="5" name="Picture 4" descr="Chart, scatter chart&#10;&#10;Description automatically generated">
+            <a:extLst>
+              <a:ext uri="{FF2B5EF4-FFF2-40B4-BE49-F238E27FC236}">
+                <a16:creationId xmlns:a16="http://schemas.microsoft.com/office/drawing/2014/main" id="{09AD962D-0F94-478C-9D1F-B00891A1D91A}"/>
+              </a:ext>
+            </a:extLst>
+          </p:cNvPr>
+          <p:cNvPicPr>
+            <a:picLocks noChangeAspect="1"/>
+          </p:cNvPicPr>
+          <p:nvPr/>
+        </p:nvPicPr>
+        <p:blipFill rotWithShape="1">
+          <a:blip r:embed="rId2"/>
+          <a:srcRect r="29400"/>
+          <a:stretch/>
+        </p:blipFill>
+        <p:spPr>
+          <a:xfrm>
+            <a:off x="3402074" y="1837835"/>
+            <a:ext cx="3748997" cy="3982675"/>
+          </a:xfrm>
+          <a:prstGeom prst="rect">
+            <a:avLst/>
+          </a:prstGeom>
+        </p:spPr>
+      </p:pic>
+      <p:pic>
+        <p:nvPicPr>
+          <p:cNvPr id="7" name="Picture 6" descr="Chart, scatter chart&#10;&#10;Description automatically generated">
+            <a:extLst>
+              <a:ext uri="{FF2B5EF4-FFF2-40B4-BE49-F238E27FC236}">
+                <a16:creationId xmlns:a16="http://schemas.microsoft.com/office/drawing/2014/main" id="{D5317F2F-1B77-4B38-AC84-08CC347F1879}"/>
+              </a:ext>
+            </a:extLst>
+          </p:cNvPr>
+          <p:cNvPicPr>
+            <a:picLocks noChangeAspect="1"/>
+          </p:cNvPicPr>
+          <p:nvPr/>
+        </p:nvPicPr>
+        <p:blipFill>
+          <a:blip r:embed="rId3"/>
+          <a:stretch>
+            <a:fillRect/>
+          </a:stretch>
+        </p:blipFill>
+        <p:spPr>
+          <a:xfrm>
+            <a:off x="7151071" y="1837835"/>
+            <a:ext cx="5310233" cy="3982675"/>
+          </a:xfrm>
+          <a:prstGeom prst="rect">
+            <a:avLst/>
+          </a:prstGeom>
+        </p:spPr>
+      </p:pic>
+    </p:spTree>
+    <p:extLst>
+      <p:ext uri="{BB962C8B-B14F-4D97-AF65-F5344CB8AC3E}">
+        <p14:creationId xmlns:p14="http://schemas.microsoft.com/office/powerpoint/2010/main" val="1510712571"/>
+      </p:ext>
+    </p:extLst>
+  </p:cSld>
+  <p:clrMapOvr>
+    <a:masterClrMapping/>
+  </p:clrMapOvr>
+</p:sld>
+</file>
+
+<file path=ppt/slides/slide6.xml><?xml version="1.0" encoding="utf-8"?>
+<p:sld xmlns:a="http://schemas.openxmlformats.org/drawingml/2006/main" xmlns:r="http://schemas.openxmlformats.org/officeDocument/2006/relationships" xmlns:p="http://schemas.openxmlformats.org/presentationml/2006/main">
+  <p:cSld>
+    <p:spTree>
+      <p:nvGrpSpPr>
+        <p:cNvPr id="1" name=""/>
+        <p:cNvGrpSpPr/>
+        <p:nvPr/>
+      </p:nvGrpSpPr>
+      <p:grpSpPr>
+        <a:xfrm>
+          <a:off x="0" y="0"/>
+          <a:ext cx="0" cy="0"/>
+          <a:chOff x="0" y="0"/>
+          <a:chExt cx="0" cy="0"/>
+        </a:xfrm>
+      </p:grpSpPr>
+      <p:sp>
+        <p:nvSpPr>
+          <p:cNvPr id="2" name="Text Placeholder 1">
+            <a:extLst>
+              <a:ext uri="{FF2B5EF4-FFF2-40B4-BE49-F238E27FC236}">
+                <a16:creationId xmlns:a16="http://schemas.microsoft.com/office/drawing/2014/main" id="{B8BE6083-843E-4374-933A-2BE17CAADA82}"/>
+              </a:ext>
+            </a:extLst>
+          </p:cNvPr>
+          <p:cNvSpPr>
+            <a:spLocks noGrp="1"/>
+          </p:cNvSpPr>
+          <p:nvPr>
+            <p:ph type="body" idx="1"/>
+          </p:nvPr>
+        </p:nvSpPr>
+        <p:spPr/>
+        <p:txBody>
+          <a:bodyPr/>
+          <a:lstStyle/>
+          <a:p>
+            <a:r>
+              <a:rPr lang="en-GB" dirty="0"/>
+              <a:t>Without</a:t>
+            </a:r>
+          </a:p>
+        </p:txBody>
+      </p:sp>
+      <p:sp>
+        <p:nvSpPr>
+          <p:cNvPr id="3" name="Content Placeholder 2">
+            <a:extLst>
+              <a:ext uri="{FF2B5EF4-FFF2-40B4-BE49-F238E27FC236}">
+                <a16:creationId xmlns:a16="http://schemas.microsoft.com/office/drawing/2014/main" id="{66130370-2A0B-4DBB-8465-00D3F5B4096E}"/>
+              </a:ext>
+            </a:extLst>
+          </p:cNvPr>
+          <p:cNvSpPr>
+            <a:spLocks noGrp="1"/>
+          </p:cNvSpPr>
+          <p:nvPr>
+            <p:ph sz="half" idx="2"/>
+          </p:nvPr>
+        </p:nvSpPr>
+        <p:spPr/>
+        <p:txBody>
+          <a:bodyPr/>
+          <a:lstStyle/>
+          <a:p>
+            <a:r>
+              <a:rPr lang="en-GB" dirty="0"/>
+              <a:t>Accuracy: 65.2%</a:t>
+            </a:r>
+          </a:p>
+          <a:p>
+            <a:r>
+              <a:rPr lang="en-GB" dirty="0"/>
+              <a:t>Standard Deviation: 4.03</a:t>
+            </a:r>
+          </a:p>
+        </p:txBody>
+      </p:sp>
+      <p:sp>
+        <p:nvSpPr>
+          <p:cNvPr id="4" name="Text Placeholder 3">
+            <a:extLst>
+              <a:ext uri="{FF2B5EF4-FFF2-40B4-BE49-F238E27FC236}">
+                <a16:creationId xmlns:a16="http://schemas.microsoft.com/office/drawing/2014/main" id="{47D7A67B-9E93-47B6-BEC4-A2ADDD7E950C}"/>
+              </a:ext>
+            </a:extLst>
+          </p:cNvPr>
+          <p:cNvSpPr>
+            <a:spLocks noGrp="1"/>
+          </p:cNvSpPr>
+          <p:nvPr>
+            <p:ph type="body" sz="quarter" idx="3"/>
+          </p:nvPr>
+        </p:nvSpPr>
+        <p:spPr/>
+        <p:txBody>
+          <a:bodyPr/>
+          <a:lstStyle/>
+          <a:p>
+            <a:r>
+              <a:rPr lang="en-GB" dirty="0"/>
+              <a:t>With</a:t>
+            </a:r>
+          </a:p>
+        </p:txBody>
+      </p:sp>
+      <p:sp>
+        <p:nvSpPr>
+          <p:cNvPr id="5" name="Content Placeholder 4">
+            <a:extLst>
+              <a:ext uri="{FF2B5EF4-FFF2-40B4-BE49-F238E27FC236}">
+                <a16:creationId xmlns:a16="http://schemas.microsoft.com/office/drawing/2014/main" id="{3535F67E-C81D-4BC4-AB67-D415CE6FE6F7}"/>
+              </a:ext>
+            </a:extLst>
+          </p:cNvPr>
+          <p:cNvSpPr>
+            <a:spLocks noGrp="1"/>
+          </p:cNvSpPr>
+          <p:nvPr>
+            <p:ph sz="quarter" idx="4"/>
+          </p:nvPr>
+        </p:nvSpPr>
+        <p:spPr/>
+        <p:txBody>
+          <a:bodyPr/>
+          <a:lstStyle/>
+          <a:p>
+            <a:r>
+              <a:rPr lang="en-GB" dirty="0"/>
+              <a:t>Accuracy: 79.7%</a:t>
+            </a:r>
+          </a:p>
+          <a:p>
+            <a:r>
+              <a:rPr lang="en-GB" dirty="0"/>
+              <a:t>Standard Deviation: 3.76</a:t>
+            </a:r>
+          </a:p>
+          <a:p>
+            <a:endParaRPr lang="en-GB" dirty="0"/>
+          </a:p>
+        </p:txBody>
+      </p:sp>
+      <p:sp>
+        <p:nvSpPr>
+          <p:cNvPr id="6" name="Title 5">
+            <a:extLst>
+              <a:ext uri="{FF2B5EF4-FFF2-40B4-BE49-F238E27FC236}">
+                <a16:creationId xmlns:a16="http://schemas.microsoft.com/office/drawing/2014/main" id="{BFE883A1-329B-45CC-AC8E-7EE8784BFA2A}"/>
+              </a:ext>
+            </a:extLst>
+          </p:cNvPr>
+          <p:cNvSpPr>
+            <a:spLocks noGrp="1"/>
+          </p:cNvSpPr>
+          <p:nvPr>
+            <p:ph type="title"/>
+          </p:nvPr>
+        </p:nvSpPr>
+        <p:spPr/>
+        <p:txBody>
+          <a:bodyPr/>
+          <a:lstStyle/>
+          <a:p>
+            <a:r>
+              <a:rPr lang="en-GB" dirty="0"/>
+              <a:t>Vowel - </a:t>
+            </a:r>
+            <a:r>
+              <a:rPr lang="en-GB" dirty="0" err="1"/>
+              <a:t>adaboost</a:t>
+            </a:r>
+            <a:endParaRPr lang="en-GB" dirty="0"/>
+          </a:p>
+        </p:txBody>
+      </p:sp>
+    </p:spTree>
+    <p:extLst>
+      <p:ext uri="{BB962C8B-B14F-4D97-AF65-F5344CB8AC3E}">
+        <p14:creationId xmlns:p14="http://schemas.microsoft.com/office/powerpoint/2010/main" val="1329758991"/>
+      </p:ext>
+    </p:extLst>
+  </p:cSld>
+  <p:clrMapOvr>
+    <a:masterClrMapping/>
+  </p:clrMapOvr>
+</p:sld>
+</file>
+
+<file path=ppt/slides/slide7.xml><?xml version="1.0" encoding="utf-8"?>
+<p:sld xmlns:a="http://schemas.openxmlformats.org/drawingml/2006/main" xmlns:r="http://schemas.openxmlformats.org/officeDocument/2006/relationships" xmlns:p="http://schemas.openxmlformats.org/presentationml/2006/main">
+  <p:cSld>
+    <p:spTree>
+      <p:nvGrpSpPr>
+        <p:cNvPr id="1" name=""/>
+        <p:cNvGrpSpPr/>
+        <p:nvPr/>
+      </p:nvGrpSpPr>
+      <p:grpSpPr>
+        <a:xfrm>
+          <a:off x="0" y="0"/>
+          <a:ext cx="0" cy="0"/>
+          <a:chOff x="0" y="0"/>
+          <a:chExt cx="0" cy="0"/>
+        </a:xfrm>
+      </p:grpSpPr>
+      <p:pic>
+        <p:nvPicPr>
+          <p:cNvPr id="11" name="Picture 10" descr="Chart, scatter chart&#10;&#10;Description automatically generated">
+            <a:extLst>
+              <a:ext uri="{FF2B5EF4-FFF2-40B4-BE49-F238E27FC236}">
+                <a16:creationId xmlns:a16="http://schemas.microsoft.com/office/drawing/2014/main" id="{B93B8BD8-EE7C-44F2-B5EE-5FA16F7BAF46}"/>
+              </a:ext>
+            </a:extLst>
+          </p:cNvPr>
+          <p:cNvPicPr>
+            <a:picLocks noChangeAspect="1"/>
+          </p:cNvPicPr>
+          <p:nvPr/>
+        </p:nvPicPr>
+        <p:blipFill rotWithShape="1">
+          <a:blip r:embed="rId2"/>
+          <a:srcRect l="5271" t="9676" r="7092" b="4118"/>
+          <a:stretch/>
+        </p:blipFill>
+        <p:spPr>
+          <a:xfrm>
+            <a:off x="4605641" y="3382750"/>
+            <a:ext cx="4431906" cy="3269714"/>
+          </a:xfrm>
+          <a:prstGeom prst="rect">
+            <a:avLst/>
+          </a:prstGeom>
+        </p:spPr>
+      </p:pic>
+      <p:sp>
+        <p:nvSpPr>
+          <p:cNvPr id="2" name="Title 1">
+            <a:extLst>
+              <a:ext uri="{FF2B5EF4-FFF2-40B4-BE49-F238E27FC236}">
+                <a16:creationId xmlns:a16="http://schemas.microsoft.com/office/drawing/2014/main" id="{13DA2BD8-448F-474C-BD37-54043ABB7369}"/>
+              </a:ext>
+            </a:extLst>
+          </p:cNvPr>
+          <p:cNvSpPr>
+            <a:spLocks noGrp="1"/>
+          </p:cNvSpPr>
+          <p:nvPr>
+            <p:ph type="title"/>
+          </p:nvPr>
+        </p:nvSpPr>
+        <p:spPr/>
+        <p:txBody>
+          <a:bodyPr/>
+          <a:lstStyle/>
+          <a:p>
+            <a:r>
+              <a:rPr lang="en-GB" dirty="0"/>
+              <a:t>Decision tree - Iris</a:t>
+            </a:r>
+          </a:p>
+        </p:txBody>
+      </p:sp>
+      <p:sp>
+        <p:nvSpPr>
+          <p:cNvPr id="3" name="Content Placeholder 2">
+            <a:extLst>
+              <a:ext uri="{FF2B5EF4-FFF2-40B4-BE49-F238E27FC236}">
+                <a16:creationId xmlns:a16="http://schemas.microsoft.com/office/drawing/2014/main" id="{B8CCE1A7-598C-48E6-94D2-CC07FF1CB111}"/>
+              </a:ext>
+            </a:extLst>
+          </p:cNvPr>
+          <p:cNvSpPr>
+            <a:spLocks noGrp="1"/>
+          </p:cNvSpPr>
+          <p:nvPr>
+            <p:ph idx="1"/>
+          </p:nvPr>
+        </p:nvSpPr>
+        <p:spPr>
+          <a:xfrm>
+            <a:off x="289644" y="1993301"/>
+            <a:ext cx="6296685" cy="3210352"/>
+          </a:xfrm>
+        </p:spPr>
+        <p:txBody>
+          <a:bodyPr>
+            <a:normAutofit/>
+          </a:bodyPr>
+          <a:lstStyle/>
+          <a:p>
+            <a:r>
+              <a:rPr lang="en-GB" dirty="0"/>
+              <a:t>Without boosting: 92.7</a:t>
+            </a:r>
+          </a:p>
+          <a:p>
+            <a:r>
+              <a:rPr lang="en-GB" dirty="0"/>
+              <a:t>With boosting: 93.7%</a:t>
+            </a:r>
+          </a:p>
+        </p:txBody>
+      </p:sp>
+      <p:pic>
+        <p:nvPicPr>
+          <p:cNvPr id="10" name="Picture 9" descr="Chart, scatter chart&#10;&#10;Description automatically generated">
+            <a:extLst>
+              <a:ext uri="{FF2B5EF4-FFF2-40B4-BE49-F238E27FC236}">
+                <a16:creationId xmlns:a16="http://schemas.microsoft.com/office/drawing/2014/main" id="{4BC1B2D4-F491-49B7-8A1C-D674495DBEDD}"/>
+              </a:ext>
+            </a:extLst>
+          </p:cNvPr>
+          <p:cNvPicPr>
+            <a:picLocks noChangeAspect="1"/>
+          </p:cNvPicPr>
+          <p:nvPr/>
+        </p:nvPicPr>
+        <p:blipFill rotWithShape="1">
+          <a:blip r:embed="rId3"/>
+          <a:srcRect r="28494"/>
+          <a:stretch/>
+        </p:blipFill>
+        <p:spPr>
+          <a:xfrm>
+            <a:off x="7998253" y="1439035"/>
+            <a:ext cx="3411869" cy="3578572"/>
+          </a:xfrm>
+          <a:prstGeom prst="rect">
+            <a:avLst/>
+          </a:prstGeom>
+        </p:spPr>
+      </p:pic>
+    </p:spTree>
+    <p:extLst>
+      <p:ext uri="{BB962C8B-B14F-4D97-AF65-F5344CB8AC3E}">
+        <p14:creationId xmlns:p14="http://schemas.microsoft.com/office/powerpoint/2010/main" val="3637565257"/>
+      </p:ext>
+    </p:extLst>
+  </p:cSld>
+  <p:clrMapOvr>
+    <a:masterClrMapping/>
+  </p:clrMapOvr>
+</p:sld>
+</file>
+
+<file path=ppt/slides/slide8.xml><?xml version="1.0" encoding="utf-8"?>
+<p:sld xmlns:a="http://schemas.openxmlformats.org/drawingml/2006/main" xmlns:r="http://schemas.openxmlformats.org/officeDocument/2006/relationships" xmlns:p="http://schemas.openxmlformats.org/presentationml/2006/main">
+  <p:cSld>
+    <p:spTree>
+      <p:nvGrpSpPr>
+        <p:cNvPr id="1" name=""/>
+        <p:cNvGrpSpPr/>
+        <p:nvPr/>
+      </p:nvGrpSpPr>
+      <p:grpSpPr>
+        <a:xfrm>
+          <a:off x="0" y="0"/>
+          <a:ext cx="0" cy="0"/>
+          <a:chOff x="0" y="0"/>
+          <a:chExt cx="0" cy="0"/>
+        </a:xfrm>
+      </p:grpSpPr>
+      <p:sp>
+        <p:nvSpPr>
+          <p:cNvPr id="2" name="Title 1">
+            <a:extLst>
+              <a:ext uri="{FF2B5EF4-FFF2-40B4-BE49-F238E27FC236}">
+                <a16:creationId xmlns:a16="http://schemas.microsoft.com/office/drawing/2014/main" id="{13DA2BD8-448F-474C-BD37-54043ABB7369}"/>
+              </a:ext>
+            </a:extLst>
+          </p:cNvPr>
+          <p:cNvSpPr>
+            <a:spLocks noGrp="1"/>
+          </p:cNvSpPr>
+          <p:nvPr>
+            <p:ph type="title"/>
+          </p:nvPr>
+        </p:nvSpPr>
+        <p:spPr/>
+        <p:txBody>
+          <a:bodyPr/>
+          <a:lstStyle/>
+          <a:p>
+            <a:r>
+              <a:rPr lang="en-GB" dirty="0"/>
+              <a:t>Decision tree - Vowel</a:t>
+            </a:r>
+          </a:p>
+        </p:txBody>
+      </p:sp>
+      <p:sp>
+        <p:nvSpPr>
+          <p:cNvPr id="3" name="Content Placeholder 2">
+            <a:extLst>
+              <a:ext uri="{FF2B5EF4-FFF2-40B4-BE49-F238E27FC236}">
+                <a16:creationId xmlns:a16="http://schemas.microsoft.com/office/drawing/2014/main" id="{B8CCE1A7-598C-48E6-94D2-CC07FF1CB111}"/>
+              </a:ext>
+            </a:extLst>
+          </p:cNvPr>
+          <p:cNvSpPr>
+            <a:spLocks noGrp="1"/>
+          </p:cNvSpPr>
+          <p:nvPr>
+            <p:ph idx="1"/>
+          </p:nvPr>
+        </p:nvSpPr>
+        <p:spPr>
+          <a:xfrm>
+            <a:off x="581192" y="2338063"/>
+            <a:ext cx="6296685" cy="3210352"/>
+          </a:xfrm>
+        </p:spPr>
+        <p:txBody>
+          <a:bodyPr>
+            <a:normAutofit/>
+          </a:bodyPr>
+          <a:lstStyle/>
+          <a:p>
+            <a:r>
+              <a:rPr lang="en-GB" dirty="0"/>
+              <a:t>Without boosting: 64.4% </a:t>
+            </a:r>
+          </a:p>
+          <a:p>
+            <a:r>
+              <a:rPr lang="en-GB" dirty="0"/>
+              <a:t>With boosting: 86.7%</a:t>
+            </a:r>
+          </a:p>
+        </p:txBody>
+      </p:sp>
+    </p:spTree>
+    <p:extLst>
+      <p:ext uri="{BB962C8B-B14F-4D97-AF65-F5344CB8AC3E}">
+        <p14:creationId xmlns:p14="http://schemas.microsoft.com/office/powerpoint/2010/main" val="739374447"/>
+      </p:ext>
+    </p:extLst>
+  </p:cSld>
+  <p:clrMapOvr>
+    <a:masterClrMapping/>
+  </p:clrMapOvr>
+</p:sld>
+</file>
+
+<file path=ppt/slides/slide9.xml><?xml version="1.0" encoding="utf-8"?>
+<p:sld xmlns:a="http://schemas.openxmlformats.org/drawingml/2006/main" xmlns:r="http://schemas.openxmlformats.org/officeDocument/2006/relationships" xmlns:p="http://schemas.openxmlformats.org/presentationml/2006/main">
+  <p:cSld>
+    <p:spTree>
+      <p:nvGrpSpPr>
+        <p:cNvPr id="1" name=""/>
+        <p:cNvGrpSpPr/>
+        <p:nvPr/>
+      </p:nvGrpSpPr>
+      <p:grpSpPr>
+        <a:xfrm>
+          <a:off x="0" y="0"/>
+          <a:ext cx="0" cy="0"/>
+          <a:chOff x="0" y="0"/>
+          <a:chExt cx="0" cy="0"/>
+        </a:xfrm>
+      </p:grpSpPr>
+      <p:sp>
+        <p:nvSpPr>
+          <p:cNvPr id="2" name="Title 1">
+            <a:extLst>
+              <a:ext uri="{FF2B5EF4-FFF2-40B4-BE49-F238E27FC236}">
+                <a16:creationId xmlns:a16="http://schemas.microsoft.com/office/drawing/2014/main" id="{13DA2BD8-448F-474C-BD37-54043ABB7369}"/>
+              </a:ext>
+            </a:extLst>
+          </p:cNvPr>
+          <p:cNvSpPr>
+            <a:spLocks noGrp="1"/>
+          </p:cNvSpPr>
+          <p:nvPr>
+            <p:ph type="title"/>
+          </p:nvPr>
+        </p:nvSpPr>
+        <p:spPr/>
+        <p:txBody>
+          <a:bodyPr/>
+          <a:lstStyle/>
+          <a:p>
+            <a:r>
+              <a:rPr lang="en-GB" dirty="0"/>
+              <a:t>Outliers</a:t>
+            </a:r>
+          </a:p>
+        </p:txBody>
+      </p:sp>
+      <p:sp>
+        <p:nvSpPr>
+          <p:cNvPr id="3" name="Content Placeholder 2">
+            <a:extLst>
+              <a:ext uri="{FF2B5EF4-FFF2-40B4-BE49-F238E27FC236}">
+                <a16:creationId xmlns:a16="http://schemas.microsoft.com/office/drawing/2014/main" id="{B8CCE1A7-598C-48E6-94D2-CC07FF1CB111}"/>
+              </a:ext>
+            </a:extLst>
+          </p:cNvPr>
+          <p:cNvSpPr>
+            <a:spLocks noGrp="1"/>
+          </p:cNvSpPr>
+          <p:nvPr>
+            <p:ph idx="1"/>
+          </p:nvPr>
+        </p:nvSpPr>
+        <p:spPr>
+          <a:xfrm>
+            <a:off x="581192" y="2338063"/>
+            <a:ext cx="6296685" cy="3210352"/>
+          </a:xfrm>
+        </p:spPr>
+        <p:txBody>
+          <a:bodyPr>
+            <a:normAutofit/>
+          </a:bodyPr>
+          <a:lstStyle/>
+          <a:p>
+            <a:r>
+              <a:rPr lang="en-GB" dirty="0"/>
+              <a:t>With large noise boosting can give too much precedence to outliers and overfit</a:t>
+            </a:r>
+          </a:p>
+          <a:p>
+            <a:r>
+              <a:rPr lang="en-GB" dirty="0"/>
+              <a:t>Naïve Bayes is ideal</a:t>
+            </a:r>
+          </a:p>
+          <a:p>
+            <a:r>
+              <a:rPr lang="en-GB" dirty="0"/>
+              <a:t>Decision Tree can overfit</a:t>
+            </a:r>
+          </a:p>
+        </p:txBody>
+      </p:sp>
+    </p:spTree>
+    <p:extLst>
+      <p:ext uri="{BB962C8B-B14F-4D97-AF65-F5344CB8AC3E}">
+        <p14:creationId xmlns:p14="http://schemas.microsoft.com/office/powerpoint/2010/main" val="2263994922"/>
+      </p:ext>
+    </p:extLst>
+  </p:cSld>
+  <p:clrMapOvr>
+    <a:masterClrMapping/>
+  </p:clrMapOvr>
 </p:sld>
 </file>
 
@@ -9427,21 +11103,21 @@
 </file>
 
 <file path=customXml/item2.xml><?xml version="1.0" encoding="utf-8"?>
+<p:properties xmlns:p="http://schemas.microsoft.com/office/2006/metadata/properties" xmlns:xsi="http://www.w3.org/2001/XMLSchema-instance" xmlns:pc="http://schemas.microsoft.com/office/infopath/2007/PartnerControls">
+  <documentManagement>
+    <Status xmlns="71af3243-3dd4-4a8d-8c0d-dd76da1f02a5">Not started</Status>
+    <MediaServiceKeyPoints xmlns="71af3243-3dd4-4a8d-8c0d-dd76da1f02a5" xsi:nil="true"/>
+  </documentManagement>
+</p:properties>
+</file>
+
+<file path=customXml/item3.xml><?xml version="1.0" encoding="utf-8"?>
 <?mso-contentType ?>
 <FormTemplates xmlns="http://schemas.microsoft.com/sharepoint/v3/contenttype/forms">
   <Display>DocumentLibraryForm</Display>
   <Edit>DocumentLibraryForm</Edit>
   <New>DocumentLibraryForm</New>
 </FormTemplates>
-</file>
-
-<file path=customXml/item3.xml><?xml version="1.0" encoding="utf-8"?>
-<p:properties xmlns:p="http://schemas.microsoft.com/office/2006/metadata/properties" xmlns:xsi="http://www.w3.org/2001/XMLSchema-instance" xmlns:pc="http://schemas.microsoft.com/office/infopath/2007/PartnerControls">
-  <documentManagement>
-    <Status xmlns="71af3243-3dd4-4a8d-8c0d-dd76da1f02a5">Not started</Status>
-    <MediaServiceKeyPoints xmlns="71af3243-3dd4-4a8d-8c0d-dd76da1f02a5" xsi:nil="true"/>
-  </documentManagement>
-</p:properties>
 </file>
 
 <file path=customXml/itemProps1.xml><?xml version="1.0" encoding="utf-8"?>
@@ -9464,14 +11140,6 @@
 </file>
 
 <file path=customXml/itemProps2.xml><?xml version="1.0" encoding="utf-8"?>
-<ds:datastoreItem xmlns:ds="http://schemas.openxmlformats.org/officeDocument/2006/customXml" ds:itemID="{8435A0B9-5F49-415F-9BEE-591FDACE98D1}">
-  <ds:schemaRefs>
-    <ds:schemaRef ds:uri="http://schemas.microsoft.com/sharepoint/v3/contenttype/forms"/>
-  </ds:schemaRefs>
-</ds:datastoreItem>
-</file>
-
-<file path=customXml/itemProps3.xml><?xml version="1.0" encoding="utf-8"?>
 <ds:datastoreItem xmlns:ds="http://schemas.openxmlformats.org/officeDocument/2006/customXml" ds:itemID="{ADC43B05-D266-4257-98DE-FF9D8CEDAE76}">
   <ds:schemaRefs>
     <ds:schemaRef ds:uri="http://schemas.microsoft.com/office/2006/metadata/properties"/>
@@ -9479,4 +11147,12 @@
     <ds:schemaRef ds:uri="71af3243-3dd4-4a8d-8c0d-dd76da1f02a5"/>
   </ds:schemaRefs>
 </ds:datastoreItem>
+</file>
+
+<file path=customXml/itemProps3.xml><?xml version="1.0" encoding="utf-8"?>
+<ds:datastoreItem xmlns:ds="http://schemas.openxmlformats.org/officeDocument/2006/customXml" ds:itemID="{8435A0B9-5F49-415F-9BEE-591FDACE98D1}">
+  <ds:schemaRefs>
+    <ds:schemaRef ds:uri="http://schemas.microsoft.com/sharepoint/v3/contenttype/forms"/>
+  </ds:schemaRefs>
+</ds:datastoreItem>
 </file>
</xml_diff>